<commit_message>
Added resources for presentation and first two slides
</commit_message>
<xml_diff>
--- a/presentations/BAS_1/OpenCL.pptx
+++ b/presentations/BAS_1/OpenCL.pptx
@@ -2,9 +2,23 @@
 <file path=ppt/presentation.xml><?xml version="1.0" encoding="utf-8"?>
 <p:presentation xmlns:a="http://schemas.openxmlformats.org/drawingml/2006/main" xmlns:r="http://schemas.openxmlformats.org/officeDocument/2006/relationships" xmlns:p="http://schemas.openxmlformats.org/presentationml/2006/main" saveSubsetFonts="1">
   <p:sldMasterIdLst>
-    <p:sldMasterId id="2147483648" r:id="rId1"/>
+    <p:sldMasterId id="2147483876" r:id="rId1"/>
   </p:sldMasterIdLst>
-  <p:sldSz cx="9144000" cy="6858000" type="screen4x3"/>
+  <p:notesMasterIdLst>
+    <p:notesMasterId r:id="rId11"/>
+  </p:notesMasterIdLst>
+  <p:sldIdLst>
+    <p:sldId id="265" r:id="rId2"/>
+    <p:sldId id="258" r:id="rId3"/>
+    <p:sldId id="259" r:id="rId4"/>
+    <p:sldId id="266" r:id="rId5"/>
+    <p:sldId id="260" r:id="rId6"/>
+    <p:sldId id="261" r:id="rId7"/>
+    <p:sldId id="262" r:id="rId8"/>
+    <p:sldId id="263" r:id="rId9"/>
+    <p:sldId id="264" r:id="rId10"/>
+  </p:sldIdLst>
+  <p:sldSz cx="9144000" cy="5143500" type="screen16x9"/>
   <p:notesSz cx="6858000" cy="9144000"/>
   <p:defaultTextStyle>
     <a:defPPr>
@@ -104,6 +118,476 @@
 </p:presentation>
 </file>
 
+<file path=ppt/notesMasters/notesMaster1.xml><?xml version="1.0" encoding="utf-8"?>
+<p:notesMaster xmlns:a="http://schemas.openxmlformats.org/drawingml/2006/main" xmlns:r="http://schemas.openxmlformats.org/officeDocument/2006/relationships" xmlns:p="http://schemas.openxmlformats.org/presentationml/2006/main">
+  <p:cSld>
+    <p:bg>
+      <p:bgRef idx="1001">
+        <a:schemeClr val="bg1"/>
+      </p:bgRef>
+    </p:bg>
+    <p:spTree>
+      <p:nvGrpSpPr>
+        <p:cNvPr id="1" name=""/>
+        <p:cNvGrpSpPr/>
+        <p:nvPr/>
+      </p:nvGrpSpPr>
+      <p:grpSpPr>
+        <a:xfrm>
+          <a:off x="0" y="0"/>
+          <a:ext cx="0" cy="0"/>
+          <a:chOff x="0" y="0"/>
+          <a:chExt cx="0" cy="0"/>
+        </a:xfrm>
+      </p:grpSpPr>
+      <p:sp>
+        <p:nvSpPr>
+          <p:cNvPr id="2" name="Header Placeholder 1"/>
+          <p:cNvSpPr>
+            <a:spLocks noGrp="1"/>
+          </p:cNvSpPr>
+          <p:nvPr>
+            <p:ph type="hdr" sz="quarter"/>
+          </p:nvPr>
+        </p:nvSpPr>
+        <p:spPr>
+          <a:xfrm>
+            <a:off x="0" y="0"/>
+            <a:ext cx="2971800" cy="457200"/>
+          </a:xfrm>
+          <a:prstGeom prst="rect">
+            <a:avLst/>
+          </a:prstGeom>
+        </p:spPr>
+        <p:txBody>
+          <a:bodyPr vert="horz" lIns="91440" tIns="45720" rIns="91440" bIns="45720" rtlCol="0"/>
+          <a:lstStyle>
+            <a:lvl1pPr algn="l">
+              <a:defRPr sz="1200"/>
+            </a:lvl1pPr>
+          </a:lstStyle>
+          <a:p>
+            <a:endParaRPr lang="en-US"/>
+          </a:p>
+        </p:txBody>
+      </p:sp>
+      <p:sp>
+        <p:nvSpPr>
+          <p:cNvPr id="3" name="Date Placeholder 2"/>
+          <p:cNvSpPr>
+            <a:spLocks noGrp="1"/>
+          </p:cNvSpPr>
+          <p:nvPr>
+            <p:ph type="dt" idx="1"/>
+          </p:nvPr>
+        </p:nvSpPr>
+        <p:spPr>
+          <a:xfrm>
+            <a:off x="3884613" y="0"/>
+            <a:ext cx="2971800" cy="457200"/>
+          </a:xfrm>
+          <a:prstGeom prst="rect">
+            <a:avLst/>
+          </a:prstGeom>
+        </p:spPr>
+        <p:txBody>
+          <a:bodyPr vert="horz" lIns="91440" tIns="45720" rIns="91440" bIns="45720" rtlCol="0"/>
+          <a:lstStyle>
+            <a:lvl1pPr algn="r">
+              <a:defRPr sz="1200"/>
+            </a:lvl1pPr>
+          </a:lstStyle>
+          <a:p>
+            <a:fld id="{FAF648E3-ABF5-4FCD-BDF2-371C3D165212}" type="datetimeFigureOut">
+              <a:rPr lang="en-US" smtClean="0"/>
+              <a:t>11/20/2012</a:t>
+            </a:fld>
+            <a:endParaRPr lang="en-US"/>
+          </a:p>
+        </p:txBody>
+      </p:sp>
+      <p:sp>
+        <p:nvSpPr>
+          <p:cNvPr id="4" name="Slide Image Placeholder 3"/>
+          <p:cNvSpPr>
+            <a:spLocks noGrp="1" noRot="1" noChangeAspect="1"/>
+          </p:cNvSpPr>
+          <p:nvPr>
+            <p:ph type="sldImg" idx="2"/>
+          </p:nvPr>
+        </p:nvSpPr>
+        <p:spPr>
+          <a:xfrm>
+            <a:off x="381000" y="685800"/>
+            <a:ext cx="6096000" cy="3429000"/>
+          </a:xfrm>
+          <a:prstGeom prst="rect">
+            <a:avLst/>
+          </a:prstGeom>
+          <a:noFill/>
+          <a:ln w="12700">
+            <a:solidFill>
+              <a:prstClr val="black"/>
+            </a:solidFill>
+          </a:ln>
+        </p:spPr>
+        <p:txBody>
+          <a:bodyPr vert="horz" lIns="91440" tIns="45720" rIns="91440" bIns="45720" rtlCol="0" anchor="ctr"/>
+          <a:lstStyle/>
+          <a:p>
+            <a:endParaRPr lang="en-US"/>
+          </a:p>
+        </p:txBody>
+      </p:sp>
+      <p:sp>
+        <p:nvSpPr>
+          <p:cNvPr id="5" name="Notes Placeholder 4"/>
+          <p:cNvSpPr>
+            <a:spLocks noGrp="1"/>
+          </p:cNvSpPr>
+          <p:nvPr>
+            <p:ph type="body" sz="quarter" idx="3"/>
+          </p:nvPr>
+        </p:nvSpPr>
+        <p:spPr>
+          <a:xfrm>
+            <a:off x="685800" y="4343400"/>
+            <a:ext cx="5486400" cy="4114800"/>
+          </a:xfrm>
+          <a:prstGeom prst="rect">
+            <a:avLst/>
+          </a:prstGeom>
+        </p:spPr>
+        <p:txBody>
+          <a:bodyPr vert="horz" lIns="91440" tIns="45720" rIns="91440" bIns="45720" rtlCol="0"/>
+          <a:lstStyle/>
+          <a:p>
+            <a:pPr lvl="0"/>
+            <a:r>
+              <a:rPr lang="en-US" smtClean="0"/>
+              <a:t>Click to edit Master text styles</a:t>
+            </a:r>
+          </a:p>
+          <a:p>
+            <a:pPr lvl="1"/>
+            <a:r>
+              <a:rPr lang="en-US" smtClean="0"/>
+              <a:t>Second level</a:t>
+            </a:r>
+          </a:p>
+          <a:p>
+            <a:pPr lvl="2"/>
+            <a:r>
+              <a:rPr lang="en-US" smtClean="0"/>
+              <a:t>Third level</a:t>
+            </a:r>
+          </a:p>
+          <a:p>
+            <a:pPr lvl="3"/>
+            <a:r>
+              <a:rPr lang="en-US" smtClean="0"/>
+              <a:t>Fourth level</a:t>
+            </a:r>
+          </a:p>
+          <a:p>
+            <a:pPr lvl="4"/>
+            <a:r>
+              <a:rPr lang="en-US" smtClean="0"/>
+              <a:t>Fifth level</a:t>
+            </a:r>
+            <a:endParaRPr lang="en-US"/>
+          </a:p>
+        </p:txBody>
+      </p:sp>
+      <p:sp>
+        <p:nvSpPr>
+          <p:cNvPr id="6" name="Footer Placeholder 5"/>
+          <p:cNvSpPr>
+            <a:spLocks noGrp="1"/>
+          </p:cNvSpPr>
+          <p:nvPr>
+            <p:ph type="ftr" sz="quarter" idx="4"/>
+          </p:nvPr>
+        </p:nvSpPr>
+        <p:spPr>
+          <a:xfrm>
+            <a:off x="0" y="8685213"/>
+            <a:ext cx="2971800" cy="457200"/>
+          </a:xfrm>
+          <a:prstGeom prst="rect">
+            <a:avLst/>
+          </a:prstGeom>
+        </p:spPr>
+        <p:txBody>
+          <a:bodyPr vert="horz" lIns="91440" tIns="45720" rIns="91440" bIns="45720" rtlCol="0" anchor="b"/>
+          <a:lstStyle>
+            <a:lvl1pPr algn="l">
+              <a:defRPr sz="1200"/>
+            </a:lvl1pPr>
+          </a:lstStyle>
+          <a:p>
+            <a:endParaRPr lang="en-US"/>
+          </a:p>
+        </p:txBody>
+      </p:sp>
+      <p:sp>
+        <p:nvSpPr>
+          <p:cNvPr id="7" name="Slide Number Placeholder 6"/>
+          <p:cNvSpPr>
+            <a:spLocks noGrp="1"/>
+          </p:cNvSpPr>
+          <p:nvPr>
+            <p:ph type="sldNum" sz="quarter" idx="5"/>
+          </p:nvPr>
+        </p:nvSpPr>
+        <p:spPr>
+          <a:xfrm>
+            <a:off x="3884613" y="8685213"/>
+            <a:ext cx="2971800" cy="457200"/>
+          </a:xfrm>
+          <a:prstGeom prst="rect">
+            <a:avLst/>
+          </a:prstGeom>
+        </p:spPr>
+        <p:txBody>
+          <a:bodyPr vert="horz" lIns="91440" tIns="45720" rIns="91440" bIns="45720" rtlCol="0" anchor="b"/>
+          <a:lstStyle>
+            <a:lvl1pPr algn="r">
+              <a:defRPr sz="1200"/>
+            </a:lvl1pPr>
+          </a:lstStyle>
+          <a:p>
+            <a:fld id="{E19E8DFC-DE97-490B-8572-C8B1A4CD170F}" type="slidenum">
+              <a:rPr lang="en-US" smtClean="0"/>
+              <a:t>‹#›</a:t>
+            </a:fld>
+            <a:endParaRPr lang="en-US"/>
+          </a:p>
+        </p:txBody>
+      </p:sp>
+    </p:spTree>
+    <p:extLst>
+      <p:ext uri="{BB962C8B-B14F-4D97-AF65-F5344CB8AC3E}">
+        <p14:creationId xmlns:p14="http://schemas.microsoft.com/office/powerpoint/2010/main" val="311596645"/>
+      </p:ext>
+    </p:extLst>
+  </p:cSld>
+  <p:clrMap bg1="lt1" tx1="dk1" bg2="lt2" tx2="dk2" accent1="accent1" accent2="accent2" accent3="accent3" accent4="accent4" accent5="accent5" accent6="accent6" hlink="hlink" folHlink="folHlink"/>
+  <p:notesStyle>
+    <a:lvl1pPr marL="0" algn="l" defTabSz="914400" rtl="0" eaLnBrk="1" latinLnBrk="0" hangingPunct="1">
+      <a:defRPr sz="1200" kern="1200">
+        <a:solidFill>
+          <a:schemeClr val="tx1"/>
+        </a:solidFill>
+        <a:latin typeface="+mn-lt"/>
+        <a:ea typeface="+mn-ea"/>
+        <a:cs typeface="+mn-cs"/>
+      </a:defRPr>
+    </a:lvl1pPr>
+    <a:lvl2pPr marL="457200" algn="l" defTabSz="914400" rtl="0" eaLnBrk="1" latinLnBrk="0" hangingPunct="1">
+      <a:defRPr sz="1200" kern="1200">
+        <a:solidFill>
+          <a:schemeClr val="tx1"/>
+        </a:solidFill>
+        <a:latin typeface="+mn-lt"/>
+        <a:ea typeface="+mn-ea"/>
+        <a:cs typeface="+mn-cs"/>
+      </a:defRPr>
+    </a:lvl2pPr>
+    <a:lvl3pPr marL="914400" algn="l" defTabSz="914400" rtl="0" eaLnBrk="1" latinLnBrk="0" hangingPunct="1">
+      <a:defRPr sz="1200" kern="1200">
+        <a:solidFill>
+          <a:schemeClr val="tx1"/>
+        </a:solidFill>
+        <a:latin typeface="+mn-lt"/>
+        <a:ea typeface="+mn-ea"/>
+        <a:cs typeface="+mn-cs"/>
+      </a:defRPr>
+    </a:lvl3pPr>
+    <a:lvl4pPr marL="1371600" algn="l" defTabSz="914400" rtl="0" eaLnBrk="1" latinLnBrk="0" hangingPunct="1">
+      <a:defRPr sz="1200" kern="1200">
+        <a:solidFill>
+          <a:schemeClr val="tx1"/>
+        </a:solidFill>
+        <a:latin typeface="+mn-lt"/>
+        <a:ea typeface="+mn-ea"/>
+        <a:cs typeface="+mn-cs"/>
+      </a:defRPr>
+    </a:lvl4pPr>
+    <a:lvl5pPr marL="1828800" algn="l" defTabSz="914400" rtl="0" eaLnBrk="1" latinLnBrk="0" hangingPunct="1">
+      <a:defRPr sz="1200" kern="1200">
+        <a:solidFill>
+          <a:schemeClr val="tx1"/>
+        </a:solidFill>
+        <a:latin typeface="+mn-lt"/>
+        <a:ea typeface="+mn-ea"/>
+        <a:cs typeface="+mn-cs"/>
+      </a:defRPr>
+    </a:lvl5pPr>
+    <a:lvl6pPr marL="2286000" algn="l" defTabSz="914400" rtl="0" eaLnBrk="1" latinLnBrk="0" hangingPunct="1">
+      <a:defRPr sz="1200" kern="1200">
+        <a:solidFill>
+          <a:schemeClr val="tx1"/>
+        </a:solidFill>
+        <a:latin typeface="+mn-lt"/>
+        <a:ea typeface="+mn-ea"/>
+        <a:cs typeface="+mn-cs"/>
+      </a:defRPr>
+    </a:lvl6pPr>
+    <a:lvl7pPr marL="2743200" algn="l" defTabSz="914400" rtl="0" eaLnBrk="1" latinLnBrk="0" hangingPunct="1">
+      <a:defRPr sz="1200" kern="1200">
+        <a:solidFill>
+          <a:schemeClr val="tx1"/>
+        </a:solidFill>
+        <a:latin typeface="+mn-lt"/>
+        <a:ea typeface="+mn-ea"/>
+        <a:cs typeface="+mn-cs"/>
+      </a:defRPr>
+    </a:lvl7pPr>
+    <a:lvl8pPr marL="3200400" algn="l" defTabSz="914400" rtl="0" eaLnBrk="1" latinLnBrk="0" hangingPunct="1">
+      <a:defRPr sz="1200" kern="1200">
+        <a:solidFill>
+          <a:schemeClr val="tx1"/>
+        </a:solidFill>
+        <a:latin typeface="+mn-lt"/>
+        <a:ea typeface="+mn-ea"/>
+        <a:cs typeface="+mn-cs"/>
+      </a:defRPr>
+    </a:lvl8pPr>
+    <a:lvl9pPr marL="3657600" algn="l" defTabSz="914400" rtl="0" eaLnBrk="1" latinLnBrk="0" hangingPunct="1">
+      <a:defRPr sz="1200" kern="1200">
+        <a:solidFill>
+          <a:schemeClr val="tx1"/>
+        </a:solidFill>
+        <a:latin typeface="+mn-lt"/>
+        <a:ea typeface="+mn-ea"/>
+        <a:cs typeface="+mn-cs"/>
+      </a:defRPr>
+    </a:lvl9pPr>
+  </p:notesStyle>
+</p:notesMaster>
+</file>
+
+<file path=ppt/notesSlides/notesSlide1.xml><?xml version="1.0" encoding="utf-8"?>
+<p:notes xmlns:a="http://schemas.openxmlformats.org/drawingml/2006/main" xmlns:r="http://schemas.openxmlformats.org/officeDocument/2006/relationships" xmlns:p="http://schemas.openxmlformats.org/presentationml/2006/main">
+  <p:cSld>
+    <p:spTree>
+      <p:nvGrpSpPr>
+        <p:cNvPr id="1" name=""/>
+        <p:cNvGrpSpPr/>
+        <p:nvPr/>
+      </p:nvGrpSpPr>
+      <p:grpSpPr>
+        <a:xfrm>
+          <a:off x="0" y="0"/>
+          <a:ext cx="0" cy="0"/>
+          <a:chOff x="0" y="0"/>
+          <a:chExt cx="0" cy="0"/>
+        </a:xfrm>
+      </p:grpSpPr>
+      <p:sp>
+        <p:nvSpPr>
+          <p:cNvPr id="2" name="Slide Image Placeholder 1"/>
+          <p:cNvSpPr>
+            <a:spLocks noGrp="1" noRot="1" noChangeAspect="1"/>
+          </p:cNvSpPr>
+          <p:nvPr>
+            <p:ph type="sldImg"/>
+          </p:nvPr>
+        </p:nvSpPr>
+        <p:spPr>
+          <a:xfrm>
+            <a:off x="381000" y="685800"/>
+            <a:ext cx="6096000" cy="3429000"/>
+          </a:xfrm>
+        </p:spPr>
+      </p:sp>
+      <p:sp>
+        <p:nvSpPr>
+          <p:cNvPr id="3" name="Notes Placeholder 2"/>
+          <p:cNvSpPr>
+            <a:spLocks noGrp="1"/>
+          </p:cNvSpPr>
+          <p:nvPr>
+            <p:ph type="body" idx="1"/>
+          </p:nvPr>
+        </p:nvSpPr>
+        <p:spPr/>
+        <p:txBody>
+          <a:bodyPr/>
+          <a:lstStyle/>
+          <a:p>
+            <a:r>
+              <a:rPr lang="en-US" dirty="0" smtClean="0"/>
+              <a:t>Hello guys</a:t>
+            </a:r>
+            <a:r>
+              <a:rPr lang="en-US" baseline="0" dirty="0" smtClean="0"/>
+              <a:t>.</a:t>
+            </a:r>
+          </a:p>
+          <a:p>
+            <a:r>
+              <a:rPr lang="en-US" baseline="0" dirty="0" smtClean="0"/>
+              <a:t>Ok, first things first: This presentation will be in English, because this is also the language I have chosen for my bachelor thesis.</a:t>
+            </a:r>
+          </a:p>
+          <a:p>
+            <a:r>
+              <a:rPr lang="en-US" baseline="0" dirty="0" smtClean="0"/>
+              <a:t>The topic description of my bachelor thesis is actually quite long, as most of you know probably know from the topic catalogue we got last year. Therefore I'll start with a simple picture.</a:t>
+            </a:r>
+          </a:p>
+          <a:p>
+            <a:r>
+              <a:rPr lang="en-US" baseline="0" dirty="0" smtClean="0"/>
+              <a:t>This picture shows the major components of a computer but the two most important ones [CLICK] are the CPU and the GPU.</a:t>
+            </a:r>
+          </a:p>
+          <a:p>
+            <a:r>
+              <a:rPr lang="en-US" baseline="0" dirty="0" smtClean="0"/>
+              <a:t>Most people know about the CPU. [CLICK] It runs basically all our applications. But what does the GPU do?</a:t>
+            </a:r>
+          </a:p>
+        </p:txBody>
+      </p:sp>
+      <p:sp>
+        <p:nvSpPr>
+          <p:cNvPr id="4" name="Slide Number Placeholder 3"/>
+          <p:cNvSpPr>
+            <a:spLocks noGrp="1"/>
+          </p:cNvSpPr>
+          <p:nvPr>
+            <p:ph type="sldNum" sz="quarter" idx="10"/>
+          </p:nvPr>
+        </p:nvSpPr>
+        <p:spPr/>
+        <p:txBody>
+          <a:bodyPr/>
+          <a:lstStyle/>
+          <a:p>
+            <a:fld id="{E19E8DFC-DE97-490B-8572-C8B1A4CD170F}" type="slidenum">
+              <a:rPr lang="en-US" smtClean="0"/>
+              <a:t>1</a:t>
+            </a:fld>
+            <a:endParaRPr lang="en-US"/>
+          </a:p>
+        </p:txBody>
+      </p:sp>
+    </p:spTree>
+    <p:extLst>
+      <p:ext uri="{BB962C8B-B14F-4D97-AF65-F5344CB8AC3E}">
+        <p14:creationId xmlns:p14="http://schemas.microsoft.com/office/powerpoint/2010/main" val="2754176817"/>
+      </p:ext>
+    </p:extLst>
+  </p:cSld>
+  <p:clrMapOvr>
+    <a:masterClrMapping/>
+  </p:clrMapOvr>
+</p:notes>
+</file>
+
 <file path=ppt/slideLayouts/slideLayout1.xml><?xml version="1.0" encoding="utf-8"?>
 <p:sldLayout xmlns:a="http://schemas.openxmlformats.org/drawingml/2006/main" xmlns:r="http://schemas.openxmlformats.org/officeDocument/2006/relationships" xmlns:p="http://schemas.openxmlformats.org/presentationml/2006/main" type="title" preserve="1">
   <p:cSld name="Title Slide">
@@ -133,8 +617,8 @@
         </p:nvSpPr>
         <p:spPr>
           <a:xfrm>
-            <a:off x="685800" y="2130425"/>
-            <a:ext cx="7772400" cy="1470025"/>
+            <a:off x="685800" y="1597819"/>
+            <a:ext cx="7772400" cy="1102519"/>
           </a:xfrm>
         </p:spPr>
         <p:txBody>
@@ -161,8 +645,8 @@
         </p:nvSpPr>
         <p:spPr>
           <a:xfrm>
-            <a:off x="1371600" y="3886200"/>
-            <a:ext cx="6400800" cy="1752600"/>
+            <a:off x="1371600" y="2914650"/>
+            <a:ext cx="6400800" cy="1314450"/>
           </a:xfrm>
         </p:spPr>
         <p:txBody>
@@ -286,7 +770,7 @@
             <a:fld id="{1D8BD707-D9CF-40AE-B4C6-C98DA3205C09}" type="datetimeFigureOut">
               <a:rPr lang="en-US" smtClean="0"/>
               <a:pPr/>
-              <a:t>9/18/2006</a:t>
+              <a:t>11/19/2012</a:t>
             </a:fld>
             <a:endParaRPr lang="en-US"/>
           </a:p>
@@ -336,6 +820,11 @@
         </p:txBody>
       </p:sp>
     </p:spTree>
+    <p:extLst>
+      <p:ext uri="{BB962C8B-B14F-4D97-AF65-F5344CB8AC3E}">
+        <p14:creationId xmlns:p14="http://schemas.microsoft.com/office/powerpoint/2010/main" val="503446040"/>
+      </p:ext>
+    </p:extLst>
   </p:cSld>
   <p:clrMapOvr>
     <a:masterClrMapping/>
@@ -453,7 +942,7 @@
             <a:fld id="{1D8BD707-D9CF-40AE-B4C6-C98DA3205C09}" type="datetimeFigureOut">
               <a:rPr lang="en-US" smtClean="0"/>
               <a:pPr/>
-              <a:t>9/18/2006</a:t>
+              <a:t>11/19/2012</a:t>
             </a:fld>
             <a:endParaRPr lang="en-US"/>
           </a:p>
@@ -503,6 +992,11 @@
         </p:txBody>
       </p:sp>
     </p:spTree>
+    <p:extLst>
+      <p:ext uri="{BB962C8B-B14F-4D97-AF65-F5344CB8AC3E}">
+        <p14:creationId xmlns:p14="http://schemas.microsoft.com/office/powerpoint/2010/main" val="3781064581"/>
+      </p:ext>
+    </p:extLst>
   </p:cSld>
   <p:clrMapOvr>
     <a:masterClrMapping/>
@@ -539,8 +1033,8 @@
         </p:nvSpPr>
         <p:spPr>
           <a:xfrm>
-            <a:off x="6629400" y="274638"/>
-            <a:ext cx="2057400" cy="5851525"/>
+            <a:off x="6629400" y="205979"/>
+            <a:ext cx="2057400" cy="4388644"/>
           </a:xfrm>
         </p:spPr>
         <p:txBody>
@@ -567,8 +1061,8 @@
         </p:nvSpPr>
         <p:spPr>
           <a:xfrm>
-            <a:off x="457200" y="274638"/>
-            <a:ext cx="6019800" cy="5851525"/>
+            <a:off x="457200" y="205979"/>
+            <a:ext cx="6019800" cy="4388644"/>
           </a:xfrm>
         </p:spPr>
         <p:txBody>
@@ -630,7 +1124,7 @@
             <a:fld id="{1D8BD707-D9CF-40AE-B4C6-C98DA3205C09}" type="datetimeFigureOut">
               <a:rPr lang="en-US" smtClean="0"/>
               <a:pPr/>
-              <a:t>9/18/2006</a:t>
+              <a:t>11/19/2012</a:t>
             </a:fld>
             <a:endParaRPr lang="en-US"/>
           </a:p>
@@ -680,6 +1174,11 @@
         </p:txBody>
       </p:sp>
     </p:spTree>
+    <p:extLst>
+      <p:ext uri="{BB962C8B-B14F-4D97-AF65-F5344CB8AC3E}">
+        <p14:creationId xmlns:p14="http://schemas.microsoft.com/office/powerpoint/2010/main" val="238021295"/>
+      </p:ext>
+    </p:extLst>
   </p:cSld>
   <p:clrMapOvr>
     <a:masterClrMapping/>
@@ -720,10 +1219,10 @@
           <a:lstStyle/>
           <a:p>
             <a:r>
-              <a:rPr lang="en-US" smtClean="0"/>
+              <a:rPr lang="en-US" dirty="0" smtClean="0"/>
               <a:t>Click to edit Master title style</a:t>
             </a:r>
-            <a:endParaRPr lang="en-US"/>
+            <a:endParaRPr lang="en-US" dirty="0"/>
           </a:p>
         </p:txBody>
       </p:sp>
@@ -797,7 +1296,7 @@
             <a:fld id="{1D8BD707-D9CF-40AE-B4C6-C98DA3205C09}" type="datetimeFigureOut">
               <a:rPr lang="en-US" smtClean="0"/>
               <a:pPr/>
-              <a:t>9/18/2006</a:t>
+              <a:t>11/19/2012</a:t>
             </a:fld>
             <a:endParaRPr lang="en-US"/>
           </a:p>
@@ -847,10 +1346,22 @@
         </p:txBody>
       </p:sp>
     </p:spTree>
+    <p:extLst>
+      <p:ext uri="{BB962C8B-B14F-4D97-AF65-F5344CB8AC3E}">
+        <p14:creationId xmlns:p14="http://schemas.microsoft.com/office/powerpoint/2010/main" val="1997439751"/>
+      </p:ext>
+    </p:extLst>
   </p:cSld>
   <p:clrMapOvr>
     <a:masterClrMapping/>
   </p:clrMapOvr>
+  <p:timing>
+    <p:tnLst>
+      <p:par>
+        <p:cTn id="1" dur="indefinite" restart="never" nodeType="tmRoot"/>
+      </p:par>
+    </p:tnLst>
+  </p:timing>
 </p:sldLayout>
 </file>
 
@@ -883,8 +1394,8 @@
         </p:nvSpPr>
         <p:spPr>
           <a:xfrm>
-            <a:off x="722313" y="4406900"/>
-            <a:ext cx="7772400" cy="1362075"/>
+            <a:off x="722313" y="3305176"/>
+            <a:ext cx="7772400" cy="1021556"/>
           </a:xfrm>
         </p:spPr>
         <p:txBody>
@@ -915,8 +1426,8 @@
         </p:nvSpPr>
         <p:spPr>
           <a:xfrm>
-            <a:off x="722313" y="2906713"/>
-            <a:ext cx="7772400" cy="1500187"/>
+            <a:off x="722313" y="2180035"/>
+            <a:ext cx="7772400" cy="1125140"/>
           </a:xfrm>
         </p:spPr>
         <p:txBody>
@@ -1040,7 +1551,7 @@
             <a:fld id="{1D8BD707-D9CF-40AE-B4C6-C98DA3205C09}" type="datetimeFigureOut">
               <a:rPr lang="en-US" smtClean="0"/>
               <a:pPr/>
-              <a:t>9/18/2006</a:t>
+              <a:t>11/19/2012</a:t>
             </a:fld>
             <a:endParaRPr lang="en-US"/>
           </a:p>
@@ -1090,6 +1601,11 @@
         </p:txBody>
       </p:sp>
     </p:spTree>
+    <p:extLst>
+      <p:ext uri="{BB962C8B-B14F-4D97-AF65-F5344CB8AC3E}">
+        <p14:creationId xmlns:p14="http://schemas.microsoft.com/office/powerpoint/2010/main" val="4274592326"/>
+      </p:ext>
+    </p:extLst>
   </p:cSld>
   <p:clrMapOvr>
     <a:masterClrMapping/>
@@ -1149,8 +1665,8 @@
         </p:nvSpPr>
         <p:spPr>
           <a:xfrm>
-            <a:off x="457200" y="1600200"/>
-            <a:ext cx="4038600" cy="4525963"/>
+            <a:off x="457200" y="1200151"/>
+            <a:ext cx="4038600" cy="3394472"/>
           </a:xfrm>
         </p:spPr>
         <p:txBody>
@@ -1234,8 +1750,8 @@
         </p:nvSpPr>
         <p:spPr>
           <a:xfrm>
-            <a:off x="4648200" y="1600200"/>
-            <a:ext cx="4038600" cy="4525963"/>
+            <a:off x="4648200" y="1200151"/>
+            <a:ext cx="4038600" cy="3394472"/>
           </a:xfrm>
         </p:spPr>
         <p:txBody>
@@ -1325,7 +1841,7 @@
             <a:fld id="{1D8BD707-D9CF-40AE-B4C6-C98DA3205C09}" type="datetimeFigureOut">
               <a:rPr lang="en-US" smtClean="0"/>
               <a:pPr/>
-              <a:t>9/18/2006</a:t>
+              <a:t>11/19/2012</a:t>
             </a:fld>
             <a:endParaRPr lang="en-US"/>
           </a:p>
@@ -1375,6 +1891,11 @@
         </p:txBody>
       </p:sp>
     </p:spTree>
+    <p:extLst>
+      <p:ext uri="{BB962C8B-B14F-4D97-AF65-F5344CB8AC3E}">
+        <p14:creationId xmlns:p14="http://schemas.microsoft.com/office/powerpoint/2010/main" val="2312154809"/>
+      </p:ext>
+    </p:extLst>
   </p:cSld>
   <p:clrMapOvr>
     <a:masterClrMapping/>
@@ -1438,8 +1959,8 @@
         </p:nvSpPr>
         <p:spPr>
           <a:xfrm>
-            <a:off x="457200" y="1535113"/>
-            <a:ext cx="4040188" cy="639762"/>
+            <a:off x="457200" y="1151335"/>
+            <a:ext cx="4040188" cy="479822"/>
           </a:xfrm>
         </p:spPr>
         <p:txBody>
@@ -1503,8 +2024,8 @@
         </p:nvSpPr>
         <p:spPr>
           <a:xfrm>
-            <a:off x="457200" y="2174875"/>
-            <a:ext cx="4040188" cy="3951288"/>
+            <a:off x="457200" y="1631156"/>
+            <a:ext cx="4040188" cy="2963466"/>
           </a:xfrm>
         </p:spPr>
         <p:txBody>
@@ -1588,8 +2109,8 @@
         </p:nvSpPr>
         <p:spPr>
           <a:xfrm>
-            <a:off x="4645025" y="1535113"/>
-            <a:ext cx="4041775" cy="639762"/>
+            <a:off x="4645026" y="1151335"/>
+            <a:ext cx="4041775" cy="479822"/>
           </a:xfrm>
         </p:spPr>
         <p:txBody>
@@ -1653,8 +2174,8 @@
         </p:nvSpPr>
         <p:spPr>
           <a:xfrm>
-            <a:off x="4645025" y="2174875"/>
-            <a:ext cx="4041775" cy="3951288"/>
+            <a:off x="4645026" y="1631156"/>
+            <a:ext cx="4041775" cy="2963466"/>
           </a:xfrm>
         </p:spPr>
         <p:txBody>
@@ -1744,7 +2265,7 @@
             <a:fld id="{1D8BD707-D9CF-40AE-B4C6-C98DA3205C09}" type="datetimeFigureOut">
               <a:rPr lang="en-US" smtClean="0"/>
               <a:pPr/>
-              <a:t>9/18/2006</a:t>
+              <a:t>11/19/2012</a:t>
             </a:fld>
             <a:endParaRPr lang="en-US"/>
           </a:p>
@@ -1794,6 +2315,11 @@
         </p:txBody>
       </p:sp>
     </p:spTree>
+    <p:extLst>
+      <p:ext uri="{BB962C8B-B14F-4D97-AF65-F5344CB8AC3E}">
+        <p14:creationId xmlns:p14="http://schemas.microsoft.com/office/powerpoint/2010/main" val="3375473042"/>
+      </p:ext>
+    </p:extLst>
   </p:cSld>
   <p:clrMapOvr>
     <a:masterClrMapping/>
@@ -1859,7 +2385,7 @@
             <a:fld id="{1D8BD707-D9CF-40AE-B4C6-C98DA3205C09}" type="datetimeFigureOut">
               <a:rPr lang="en-US" smtClean="0"/>
               <a:pPr/>
-              <a:t>9/18/2006</a:t>
+              <a:t>11/19/2012</a:t>
             </a:fld>
             <a:endParaRPr lang="en-US"/>
           </a:p>
@@ -1909,6 +2435,11 @@
         </p:txBody>
       </p:sp>
     </p:spTree>
+    <p:extLst>
+      <p:ext uri="{BB962C8B-B14F-4D97-AF65-F5344CB8AC3E}">
+        <p14:creationId xmlns:p14="http://schemas.microsoft.com/office/powerpoint/2010/main" val="3054377020"/>
+      </p:ext>
+    </p:extLst>
   </p:cSld>
   <p:clrMapOvr>
     <a:masterClrMapping/>
@@ -1951,7 +2482,7 @@
             <a:fld id="{1D8BD707-D9CF-40AE-B4C6-C98DA3205C09}" type="datetimeFigureOut">
               <a:rPr lang="en-US" smtClean="0"/>
               <a:pPr/>
-              <a:t>9/18/2006</a:t>
+              <a:t>11/19/2012</a:t>
             </a:fld>
             <a:endParaRPr lang="en-US"/>
           </a:p>
@@ -2001,6 +2532,11 @@
         </p:txBody>
       </p:sp>
     </p:spTree>
+    <p:extLst>
+      <p:ext uri="{BB962C8B-B14F-4D97-AF65-F5344CB8AC3E}">
+        <p14:creationId xmlns:p14="http://schemas.microsoft.com/office/powerpoint/2010/main" val="2114666886"/>
+      </p:ext>
+    </p:extLst>
   </p:cSld>
   <p:clrMapOvr>
     <a:masterClrMapping/>
@@ -2037,8 +2573,8 @@
         </p:nvSpPr>
         <p:spPr>
           <a:xfrm>
-            <a:off x="457200" y="273050"/>
-            <a:ext cx="3008313" cy="1162050"/>
+            <a:off x="457201" y="204787"/>
+            <a:ext cx="3008313" cy="871538"/>
           </a:xfrm>
         </p:spPr>
         <p:txBody>
@@ -2069,8 +2605,8 @@
         </p:nvSpPr>
         <p:spPr>
           <a:xfrm>
-            <a:off x="3575050" y="273050"/>
-            <a:ext cx="5111750" cy="5853113"/>
+            <a:off x="3575050" y="204788"/>
+            <a:ext cx="5111750" cy="4389835"/>
           </a:xfrm>
         </p:spPr>
         <p:txBody>
@@ -2154,8 +2690,8 @@
         </p:nvSpPr>
         <p:spPr>
           <a:xfrm>
-            <a:off x="457200" y="1435100"/>
-            <a:ext cx="3008313" cy="4691063"/>
+            <a:off x="457201" y="1076326"/>
+            <a:ext cx="3008313" cy="3518297"/>
           </a:xfrm>
         </p:spPr>
         <p:txBody>
@@ -2225,7 +2761,7 @@
             <a:fld id="{1D8BD707-D9CF-40AE-B4C6-C98DA3205C09}" type="datetimeFigureOut">
               <a:rPr lang="en-US" smtClean="0"/>
               <a:pPr/>
-              <a:t>9/18/2006</a:t>
+              <a:t>11/19/2012</a:t>
             </a:fld>
             <a:endParaRPr lang="en-US"/>
           </a:p>
@@ -2275,6 +2811,11 @@
         </p:txBody>
       </p:sp>
     </p:spTree>
+    <p:extLst>
+      <p:ext uri="{BB962C8B-B14F-4D97-AF65-F5344CB8AC3E}">
+        <p14:creationId xmlns:p14="http://schemas.microsoft.com/office/powerpoint/2010/main" val="2622671701"/>
+      </p:ext>
+    </p:extLst>
   </p:cSld>
   <p:clrMapOvr>
     <a:masterClrMapping/>
@@ -2311,8 +2852,8 @@
         </p:nvSpPr>
         <p:spPr>
           <a:xfrm>
-            <a:off x="1792288" y="4800600"/>
-            <a:ext cx="5486400" cy="566738"/>
+            <a:off x="1792288" y="3600450"/>
+            <a:ext cx="5486400" cy="425054"/>
           </a:xfrm>
         </p:spPr>
         <p:txBody>
@@ -2343,8 +2884,8 @@
         </p:nvSpPr>
         <p:spPr>
           <a:xfrm>
-            <a:off x="1792288" y="612775"/>
-            <a:ext cx="5486400" cy="4114800"/>
+            <a:off x="1792288" y="459581"/>
+            <a:ext cx="5486400" cy="3086100"/>
           </a:xfrm>
         </p:spPr>
         <p:txBody>
@@ -2404,8 +2945,8 @@
         </p:nvSpPr>
         <p:spPr>
           <a:xfrm>
-            <a:off x="1792288" y="5367338"/>
-            <a:ext cx="5486400" cy="804862"/>
+            <a:off x="1792288" y="4025503"/>
+            <a:ext cx="5486400" cy="603647"/>
           </a:xfrm>
         </p:spPr>
         <p:txBody>
@@ -2475,7 +3016,7 @@
             <a:fld id="{1D8BD707-D9CF-40AE-B4C6-C98DA3205C09}" type="datetimeFigureOut">
               <a:rPr lang="en-US" smtClean="0"/>
               <a:pPr/>
-              <a:t>9/18/2006</a:t>
+              <a:t>11/19/2012</a:t>
             </a:fld>
             <a:endParaRPr lang="en-US"/>
           </a:p>
@@ -2525,6 +3066,11 @@
         </p:txBody>
       </p:sp>
     </p:spTree>
+    <p:extLst>
+      <p:ext uri="{BB962C8B-B14F-4D97-AF65-F5344CB8AC3E}">
+        <p14:creationId xmlns:p14="http://schemas.microsoft.com/office/powerpoint/2010/main" val="4057780827"/>
+      </p:ext>
+    </p:extLst>
   </p:cSld>
   <p:clrMapOvr>
     <a:masterClrMapping/>
@@ -2536,9 +3082,33 @@
 <p:sldMaster xmlns:a="http://schemas.openxmlformats.org/drawingml/2006/main" xmlns:r="http://schemas.openxmlformats.org/officeDocument/2006/relationships" xmlns:p="http://schemas.openxmlformats.org/presentationml/2006/main">
   <p:cSld>
     <p:bg>
-      <p:bgRef idx="1001">
-        <a:schemeClr val="bg1"/>
-      </p:bgRef>
+      <p:bgPr>
+        <a:gradFill flip="none" rotWithShape="1">
+          <a:gsLst>
+            <a:gs pos="0">
+              <a:schemeClr val="bg1">
+                <a:lumMod val="85000"/>
+              </a:schemeClr>
+            </a:gs>
+            <a:gs pos="39999">
+              <a:schemeClr val="bg1">
+                <a:lumMod val="90000"/>
+              </a:schemeClr>
+            </a:gs>
+            <a:gs pos="70000">
+              <a:schemeClr val="bg1">
+                <a:lumMod val="95000"/>
+              </a:schemeClr>
+            </a:gs>
+            <a:gs pos="100000">
+              <a:schemeClr val="bg1"/>
+            </a:gs>
+          </a:gsLst>
+          <a:lin ang="5400000" scaled="0"/>
+          <a:tileRect/>
+        </a:gradFill>
+        <a:effectLst/>
+      </p:bgPr>
     </p:bg>
     <p:spTree>
       <p:nvGrpSpPr>
@@ -2566,8 +3136,8 @@
         </p:nvSpPr>
         <p:spPr>
           <a:xfrm>
-            <a:off x="457200" y="274638"/>
-            <a:ext cx="8229600" cy="1143000"/>
+            <a:off x="457200" y="205979"/>
+            <a:ext cx="8229600" cy="857250"/>
           </a:xfrm>
           <a:prstGeom prst="rect">
             <a:avLst/>
@@ -2599,8 +3169,8 @@
         </p:nvSpPr>
         <p:spPr>
           <a:xfrm>
-            <a:off x="457200" y="1600200"/>
-            <a:ext cx="8229600" cy="4525963"/>
+            <a:off x="457200" y="1200151"/>
+            <a:ext cx="8229600" cy="3394472"/>
           </a:xfrm>
           <a:prstGeom prst="rect">
             <a:avLst/>
@@ -2661,8 +3231,8 @@
         </p:nvSpPr>
         <p:spPr>
           <a:xfrm>
-            <a:off x="457200" y="6356350"/>
-            <a:ext cx="2133600" cy="365125"/>
+            <a:off x="457200" y="4767263"/>
+            <a:ext cx="2133600" cy="273844"/>
           </a:xfrm>
           <a:prstGeom prst="rect">
             <a:avLst/>
@@ -2685,7 +3255,7 @@
             <a:fld id="{1D8BD707-D9CF-40AE-B4C6-C98DA3205C09}" type="datetimeFigureOut">
               <a:rPr lang="en-US" smtClean="0"/>
               <a:pPr/>
-              <a:t>9/18/2006</a:t>
+              <a:t>11/19/2012</a:t>
             </a:fld>
             <a:endParaRPr lang="en-US"/>
           </a:p>
@@ -2703,8 +3273,8 @@
         </p:nvSpPr>
         <p:spPr>
           <a:xfrm>
-            <a:off x="3124200" y="6356350"/>
-            <a:ext cx="2895600" cy="365125"/>
+            <a:off x="3124200" y="4767263"/>
+            <a:ext cx="2895600" cy="273844"/>
           </a:xfrm>
           <a:prstGeom prst="rect">
             <a:avLst/>
@@ -2740,8 +3310,8 @@
         </p:nvSpPr>
         <p:spPr>
           <a:xfrm>
-            <a:off x="6553200" y="6356350"/>
-            <a:ext cx="2133600" cy="365125"/>
+            <a:off x="6553200" y="4767263"/>
+            <a:ext cx="2133600" cy="273844"/>
           </a:xfrm>
           <a:prstGeom prst="rect">
             <a:avLst/>
@@ -2771,20 +3341,25 @@
         </p:txBody>
       </p:sp>
     </p:spTree>
+    <p:extLst>
+      <p:ext uri="{BB962C8B-B14F-4D97-AF65-F5344CB8AC3E}">
+        <p14:creationId xmlns:p14="http://schemas.microsoft.com/office/powerpoint/2010/main" val="3887619898"/>
+      </p:ext>
+    </p:extLst>
   </p:cSld>
   <p:clrMap bg1="lt1" tx1="dk1" bg2="lt2" tx2="dk2" accent1="accent1" accent2="accent2" accent3="accent3" accent4="accent4" accent5="accent5" accent6="accent6" hlink="hlink" folHlink="folHlink"/>
   <p:sldLayoutIdLst>
-    <p:sldLayoutId id="2147483649" r:id="rId1"/>
-    <p:sldLayoutId id="2147483650" r:id="rId2"/>
-    <p:sldLayoutId id="2147483651" r:id="rId3"/>
-    <p:sldLayoutId id="2147483652" r:id="rId4"/>
-    <p:sldLayoutId id="2147483653" r:id="rId5"/>
-    <p:sldLayoutId id="2147483654" r:id="rId6"/>
-    <p:sldLayoutId id="2147483655" r:id="rId7"/>
-    <p:sldLayoutId id="2147483656" r:id="rId8"/>
-    <p:sldLayoutId id="2147483657" r:id="rId9"/>
-    <p:sldLayoutId id="2147483658" r:id="rId10"/>
-    <p:sldLayoutId id="2147483659" r:id="rId11"/>
+    <p:sldLayoutId id="2147483877" r:id="rId1"/>
+    <p:sldLayoutId id="2147483878" r:id="rId2"/>
+    <p:sldLayoutId id="2147483879" r:id="rId3"/>
+    <p:sldLayoutId id="2147483880" r:id="rId4"/>
+    <p:sldLayoutId id="2147483881" r:id="rId5"/>
+    <p:sldLayoutId id="2147483882" r:id="rId6"/>
+    <p:sldLayoutId id="2147483883" r:id="rId7"/>
+    <p:sldLayoutId id="2147483884" r:id="rId8"/>
+    <p:sldLayoutId id="2147483885" r:id="rId9"/>
+    <p:sldLayoutId id="2147483886" r:id="rId10"/>
+    <p:sldLayoutId id="2147483887" r:id="rId11"/>
   </p:sldLayoutIdLst>
   <p:txStyles>
     <p:titleStyle>
@@ -2942,7 +3517,7 @@
     </p:bodyStyle>
     <p:otherStyle>
       <a:defPPr>
-        <a:defRPr lang="en-US"/>
+        <a:defRPr lang="de-DE"/>
       </a:defPPr>
       <a:lvl1pPr marL="0" algn="l" defTabSz="914400" rtl="0" eaLnBrk="1" latinLnBrk="0" hangingPunct="1">
         <a:defRPr sz="1800" kern="1200">
@@ -3039,6 +3614,1825 @@
 </p:sldMaster>
 </file>
 
+<file path=ppt/slides/slide1.xml><?xml version="1.0" encoding="utf-8"?>
+<p:sld xmlns:a="http://schemas.openxmlformats.org/drawingml/2006/main" xmlns:r="http://schemas.openxmlformats.org/officeDocument/2006/relationships" xmlns:p="http://schemas.openxmlformats.org/presentationml/2006/main">
+  <p:cSld>
+    <p:spTree>
+      <p:nvGrpSpPr>
+        <p:cNvPr id="1" name=""/>
+        <p:cNvGrpSpPr/>
+        <p:nvPr/>
+      </p:nvGrpSpPr>
+      <p:grpSpPr>
+        <a:xfrm>
+          <a:off x="0" y="0"/>
+          <a:ext cx="0" cy="0"/>
+          <a:chOff x="0" y="0"/>
+          <a:chExt cx="0" cy="0"/>
+        </a:xfrm>
+      </p:grpSpPr>
+      <p:pic>
+        <p:nvPicPr>
+          <p:cNvPr id="1026" name="Picture 2" descr="D:\data\FH\Bachelorarbeit\svnroot\presentations\BAS_1\Chassis_Intenal-Components.jpg"/>
+          <p:cNvPicPr>
+            <a:picLocks noChangeAspect="1" noChangeArrowheads="1"/>
+          </p:cNvPicPr>
+          <p:nvPr/>
+        </p:nvPicPr>
+        <p:blipFill>
+          <a:blip r:embed="rId3">
+            <a:extLst>
+              <a:ext uri="{28A0092B-C50C-407E-A947-70E740481C1C}">
+                <a14:useLocalDpi xmlns:a14="http://schemas.microsoft.com/office/drawing/2010/main" val="0"/>
+              </a:ext>
+            </a:extLst>
+          </a:blip>
+          <a:srcRect/>
+          <a:stretch>
+            <a:fillRect/>
+          </a:stretch>
+        </p:blipFill>
+        <p:spPr bwMode="auto">
+          <a:xfrm>
+            <a:off x="1597818" y="240506"/>
+            <a:ext cx="5948363" cy="4662488"/>
+          </a:xfrm>
+          <a:prstGeom prst="roundRect">
+            <a:avLst>
+              <a:gd name="adj" fmla="val 8594"/>
+            </a:avLst>
+          </a:prstGeom>
+          <a:solidFill>
+            <a:srgbClr val="FFFFFF">
+              <a:shade val="85000"/>
+            </a:srgbClr>
+          </a:solidFill>
+          <a:ln>
+            <a:noFill/>
+          </a:ln>
+          <a:effectLst/>
+          <a:extLst>
+            <a:ext uri="{909E8E84-426E-40DD-AFC4-6F175D3DCCD1}">
+              <a14:hiddenFill xmlns:a14="http://schemas.microsoft.com/office/drawing/2010/main">
+                <a:solidFill>
+                  <a:srgbClr val="FFFFFF"/>
+                </a:solidFill>
+              </a14:hiddenFill>
+            </a:ext>
+          </a:extLst>
+        </p:spPr>
+      </p:pic>
+      <p:sp>
+        <p:nvSpPr>
+          <p:cNvPr id="4" name="TextBox 3"/>
+          <p:cNvSpPr txBox="1"/>
+          <p:nvPr/>
+        </p:nvSpPr>
+        <p:spPr>
+          <a:xfrm>
+            <a:off x="6094562" y="4981917"/>
+            <a:ext cx="3048000" cy="184666"/>
+          </a:xfrm>
+          <a:prstGeom prst="rect">
+            <a:avLst/>
+          </a:prstGeom>
+          <a:noFill/>
+        </p:spPr>
+        <p:txBody>
+          <a:bodyPr wrap="square" rtlCol="0">
+            <a:spAutoFit/>
+          </a:bodyPr>
+          <a:lstStyle/>
+          <a:p>
+            <a:pPr algn="r"/>
+            <a:r>
+              <a:rPr lang="en-US" sz="600" dirty="0"/>
+              <a:t>http://blogs.amd.com/play/2012/05/01/building-on-amd-hardware/</a:t>
+            </a:r>
+          </a:p>
+        </p:txBody>
+      </p:sp>
+      <p:sp>
+        <p:nvSpPr>
+          <p:cNvPr id="5" name="TextBox 4"/>
+          <p:cNvSpPr txBox="1"/>
+          <p:nvPr/>
+        </p:nvSpPr>
+        <p:spPr>
+          <a:xfrm>
+            <a:off x="1331568" y="501474"/>
+            <a:ext cx="1890252" cy="1015663"/>
+          </a:xfrm>
+          <a:prstGeom prst="rect">
+            <a:avLst/>
+          </a:prstGeom>
+          <a:solidFill>
+            <a:schemeClr val="accent1">
+              <a:lumMod val="60000"/>
+              <a:lumOff val="40000"/>
+            </a:schemeClr>
+          </a:solidFill>
+          <a:effectLst/>
+          <a:scene3d>
+            <a:camera prst="orthographicFront"/>
+            <a:lightRig rig="threePt" dir="t"/>
+          </a:scene3d>
+          <a:sp3d>
+            <a:bevelT h="50800"/>
+          </a:sp3d>
+        </p:spPr>
+        <p:txBody>
+          <a:bodyPr wrap="square" rtlCol="0">
+            <a:spAutoFit/>
+          </a:bodyPr>
+          <a:lstStyle/>
+          <a:p>
+            <a:pPr algn="ctr"/>
+            <a:r>
+              <a:rPr lang="en-US" sz="6000" dirty="0" smtClean="0"/>
+              <a:t>CPU</a:t>
+            </a:r>
+            <a:endParaRPr lang="en-US" sz="6000" dirty="0"/>
+          </a:p>
+        </p:txBody>
+      </p:sp>
+      <p:sp>
+        <p:nvSpPr>
+          <p:cNvPr id="7" name="TextBox 6"/>
+          <p:cNvSpPr txBox="1"/>
+          <p:nvPr/>
+        </p:nvSpPr>
+        <p:spPr>
+          <a:xfrm>
+            <a:off x="6192216" y="3201834"/>
+            <a:ext cx="1890252" cy="1015663"/>
+          </a:xfrm>
+          <a:prstGeom prst="rect">
+            <a:avLst/>
+          </a:prstGeom>
+          <a:solidFill>
+            <a:schemeClr val="accent3">
+              <a:lumMod val="60000"/>
+              <a:lumOff val="40000"/>
+            </a:schemeClr>
+          </a:solidFill>
+          <a:effectLst/>
+          <a:scene3d>
+            <a:camera prst="orthographicFront"/>
+            <a:lightRig rig="threePt" dir="t"/>
+          </a:scene3d>
+          <a:sp3d>
+            <a:bevelT/>
+          </a:sp3d>
+        </p:spPr>
+        <p:txBody>
+          <a:bodyPr wrap="square" rtlCol="0">
+            <a:spAutoFit/>
+          </a:bodyPr>
+          <a:lstStyle/>
+          <a:p>
+            <a:pPr algn="ctr"/>
+            <a:r>
+              <a:rPr lang="en-US" sz="6000" dirty="0" smtClean="0"/>
+              <a:t>GPU</a:t>
+            </a:r>
+            <a:endParaRPr lang="en-US" sz="6000" dirty="0"/>
+          </a:p>
+        </p:txBody>
+      </p:sp>
+      <p:sp>
+        <p:nvSpPr>
+          <p:cNvPr id="8" name="TextBox 7"/>
+          <p:cNvSpPr txBox="1"/>
+          <p:nvPr/>
+        </p:nvSpPr>
+        <p:spPr>
+          <a:xfrm>
+            <a:off x="1241556" y="1851654"/>
+            <a:ext cx="2070276" cy="523220"/>
+          </a:xfrm>
+          <a:prstGeom prst="rect">
+            <a:avLst/>
+          </a:prstGeom>
+          <a:solidFill>
+            <a:schemeClr val="accent1">
+              <a:lumMod val="60000"/>
+              <a:lumOff val="40000"/>
+            </a:schemeClr>
+          </a:solidFill>
+          <a:effectLst/>
+          <a:scene3d>
+            <a:camera prst="orthographicFront"/>
+            <a:lightRig rig="threePt" dir="t"/>
+          </a:scene3d>
+          <a:sp3d>
+            <a:bevelT h="50800"/>
+          </a:sp3d>
+        </p:spPr>
+        <p:txBody>
+          <a:bodyPr wrap="square" rtlCol="0">
+            <a:spAutoFit/>
+          </a:bodyPr>
+          <a:lstStyle>
+            <a:defPPr>
+              <a:defRPr lang="en-US"/>
+            </a:defPPr>
+            <a:lvl1pPr algn="ctr">
+              <a:defRPr sz="6000"/>
+            </a:lvl1pPr>
+          </a:lstStyle>
+          <a:p>
+            <a:r>
+              <a:rPr lang="en-US" sz="2800" dirty="0"/>
+              <a:t>Applications</a:t>
+            </a:r>
+          </a:p>
+        </p:txBody>
+      </p:sp>
+      <p:sp>
+        <p:nvSpPr>
+          <p:cNvPr id="10" name="TextBox 9"/>
+          <p:cNvSpPr txBox="1"/>
+          <p:nvPr/>
+        </p:nvSpPr>
+        <p:spPr>
+          <a:xfrm>
+            <a:off x="6086221" y="2301714"/>
+            <a:ext cx="2070276" cy="523220"/>
+          </a:xfrm>
+          <a:prstGeom prst="rect">
+            <a:avLst/>
+          </a:prstGeom>
+          <a:solidFill>
+            <a:schemeClr val="accent3">
+              <a:lumMod val="60000"/>
+              <a:lumOff val="40000"/>
+            </a:schemeClr>
+          </a:solidFill>
+          <a:effectLst/>
+          <a:scene3d>
+            <a:camera prst="orthographicFront"/>
+            <a:lightRig rig="threePt" dir="t"/>
+          </a:scene3d>
+          <a:sp3d>
+            <a:bevelT h="50800"/>
+          </a:sp3d>
+        </p:spPr>
+        <p:txBody>
+          <a:bodyPr wrap="square" rtlCol="0">
+            <a:spAutoFit/>
+          </a:bodyPr>
+          <a:lstStyle>
+            <a:defPPr>
+              <a:defRPr lang="en-US"/>
+            </a:defPPr>
+            <a:lvl1pPr algn="ctr">
+              <a:defRPr sz="6000"/>
+            </a:lvl1pPr>
+          </a:lstStyle>
+          <a:p>
+            <a:r>
+              <a:rPr lang="en-US" sz="2800" dirty="0" smtClean="0"/>
+              <a:t>??</a:t>
+            </a:r>
+            <a:endParaRPr lang="en-US" sz="2800" dirty="0"/>
+          </a:p>
+        </p:txBody>
+      </p:sp>
+    </p:spTree>
+    <p:extLst>
+      <p:ext uri="{BB962C8B-B14F-4D97-AF65-F5344CB8AC3E}">
+        <p14:creationId xmlns:p14="http://schemas.microsoft.com/office/powerpoint/2010/main" val="2094512384"/>
+      </p:ext>
+    </p:extLst>
+  </p:cSld>
+  <p:clrMapOvr>
+    <a:masterClrMapping/>
+  </p:clrMapOvr>
+  <p:timing>
+    <p:tnLst>
+      <p:par>
+        <p:cTn id="1" dur="indefinite" restart="never" nodeType="tmRoot">
+          <p:childTnLst>
+            <p:seq concurrent="1" nextAc="seek">
+              <p:cTn id="2" dur="indefinite" nodeType="mainSeq">
+                <p:childTnLst>
+                  <p:par>
+                    <p:cTn id="3" fill="hold">
+                      <p:stCondLst>
+                        <p:cond delay="indefinite"/>
+                      </p:stCondLst>
+                      <p:childTnLst>
+                        <p:par>
+                          <p:cTn id="4" fill="hold">
+                            <p:stCondLst>
+                              <p:cond delay="0"/>
+                            </p:stCondLst>
+                            <p:childTnLst>
+                              <p:par>
+                                <p:cTn id="5" presetID="10" presetClass="entr" presetSubtype="0" fill="hold" grpId="0" nodeType="clickEffect">
+                                  <p:stCondLst>
+                                    <p:cond delay="0"/>
+                                  </p:stCondLst>
+                                  <p:childTnLst>
+                                    <p:set>
+                                      <p:cBhvr>
+                                        <p:cTn id="6" dur="1" fill="hold">
+                                          <p:stCondLst>
+                                            <p:cond delay="0"/>
+                                          </p:stCondLst>
+                                        </p:cTn>
+                                        <p:tgtEl>
+                                          <p:spTgt spid="5"/>
+                                        </p:tgtEl>
+                                        <p:attrNameLst>
+                                          <p:attrName>style.visibility</p:attrName>
+                                        </p:attrNameLst>
+                                      </p:cBhvr>
+                                      <p:to>
+                                        <p:strVal val="visible"/>
+                                      </p:to>
+                                    </p:set>
+                                    <p:animEffect transition="in" filter="fade">
+                                      <p:cBhvr>
+                                        <p:cTn id="7" dur="500"/>
+                                        <p:tgtEl>
+                                          <p:spTgt spid="5"/>
+                                        </p:tgtEl>
+                                      </p:cBhvr>
+                                    </p:animEffect>
+                                  </p:childTnLst>
+                                </p:cTn>
+                              </p:par>
+                              <p:par>
+                                <p:cTn id="8" presetID="10" presetClass="entr" presetSubtype="0" fill="hold" grpId="0" nodeType="withEffect">
+                                  <p:stCondLst>
+                                    <p:cond delay="0"/>
+                                  </p:stCondLst>
+                                  <p:childTnLst>
+                                    <p:set>
+                                      <p:cBhvr>
+                                        <p:cTn id="9" dur="1" fill="hold">
+                                          <p:stCondLst>
+                                            <p:cond delay="0"/>
+                                          </p:stCondLst>
+                                        </p:cTn>
+                                        <p:tgtEl>
+                                          <p:spTgt spid="7"/>
+                                        </p:tgtEl>
+                                        <p:attrNameLst>
+                                          <p:attrName>style.visibility</p:attrName>
+                                        </p:attrNameLst>
+                                      </p:cBhvr>
+                                      <p:to>
+                                        <p:strVal val="visible"/>
+                                      </p:to>
+                                    </p:set>
+                                    <p:animEffect transition="in" filter="fade">
+                                      <p:cBhvr>
+                                        <p:cTn id="10" dur="500"/>
+                                        <p:tgtEl>
+                                          <p:spTgt spid="7"/>
+                                        </p:tgtEl>
+                                      </p:cBhvr>
+                                    </p:animEffect>
+                                  </p:childTnLst>
+                                </p:cTn>
+                              </p:par>
+                            </p:childTnLst>
+                          </p:cTn>
+                        </p:par>
+                      </p:childTnLst>
+                    </p:cTn>
+                  </p:par>
+                </p:childTnLst>
+              </p:cTn>
+              <p:prevCondLst>
+                <p:cond evt="onPrev" delay="0">
+                  <p:tgtEl>
+                    <p:sldTgt/>
+                  </p:tgtEl>
+                </p:cond>
+              </p:prevCondLst>
+              <p:nextCondLst>
+                <p:cond evt="onNext" delay="0">
+                  <p:tgtEl>
+                    <p:sldTgt/>
+                  </p:tgtEl>
+                </p:cond>
+              </p:nextCondLst>
+            </p:seq>
+          </p:childTnLst>
+        </p:cTn>
+      </p:par>
+    </p:tnLst>
+    <p:bldLst>
+      <p:bldP spid="5" grpId="0" animBg="1"/>
+      <p:bldP spid="7" grpId="0" animBg="1"/>
+    </p:bldLst>
+  </p:timing>
+</p:sld>
+</file>
+
+<file path=ppt/slides/slide2.xml><?xml version="1.0" encoding="utf-8"?>
+<p:sld xmlns:a="http://schemas.openxmlformats.org/drawingml/2006/main" xmlns:r="http://schemas.openxmlformats.org/officeDocument/2006/relationships" xmlns:p="http://schemas.openxmlformats.org/presentationml/2006/main">
+  <p:cSld>
+    <p:spTree>
+      <p:nvGrpSpPr>
+        <p:cNvPr id="1" name=""/>
+        <p:cNvGrpSpPr/>
+        <p:nvPr/>
+      </p:nvGrpSpPr>
+      <p:grpSpPr>
+        <a:xfrm>
+          <a:off x="0" y="0"/>
+          <a:ext cx="0" cy="0"/>
+          <a:chOff x="0" y="0"/>
+          <a:chExt cx="0" cy="0"/>
+        </a:xfrm>
+      </p:grpSpPr>
+      <p:sp>
+        <p:nvSpPr>
+          <p:cNvPr id="5" name="TextBox 4"/>
+          <p:cNvSpPr txBox="1"/>
+          <p:nvPr/>
+        </p:nvSpPr>
+        <p:spPr>
+          <a:xfrm>
+            <a:off x="4932048" y="321450"/>
+            <a:ext cx="3510468" cy="1077218"/>
+          </a:xfrm>
+          <a:prstGeom prst="rect">
+            <a:avLst/>
+          </a:prstGeom>
+          <a:solidFill>
+            <a:schemeClr val="accent3">
+              <a:lumMod val="60000"/>
+              <a:lumOff val="40000"/>
+            </a:schemeClr>
+          </a:solidFill>
+          <a:scene3d>
+            <a:camera prst="orthographicFront"/>
+            <a:lightRig rig="threePt" dir="t"/>
+          </a:scene3d>
+          <a:sp3d>
+            <a:bevelT/>
+          </a:sp3d>
+        </p:spPr>
+        <p:txBody>
+          <a:bodyPr wrap="square" rtlCol="0">
+            <a:spAutoFit/>
+          </a:bodyPr>
+          <a:lstStyle/>
+          <a:p>
+            <a:pPr algn="ctr"/>
+            <a:r>
+              <a:rPr lang="en-US" sz="3200" dirty="0" smtClean="0"/>
+              <a:t>Graphics Processing Unit</a:t>
+            </a:r>
+            <a:endParaRPr lang="en-US" sz="3200" dirty="0"/>
+          </a:p>
+        </p:txBody>
+      </p:sp>
+      <p:sp>
+        <p:nvSpPr>
+          <p:cNvPr id="14" name="TextBox 13"/>
+          <p:cNvSpPr txBox="1"/>
+          <p:nvPr/>
+        </p:nvSpPr>
+        <p:spPr>
+          <a:xfrm>
+            <a:off x="701484" y="321450"/>
+            <a:ext cx="3498325" cy="1077218"/>
+          </a:xfrm>
+          <a:prstGeom prst="rect">
+            <a:avLst/>
+          </a:prstGeom>
+          <a:solidFill>
+            <a:schemeClr val="accent4">
+              <a:lumMod val="60000"/>
+              <a:lumOff val="40000"/>
+            </a:schemeClr>
+          </a:solidFill>
+          <a:scene3d>
+            <a:camera prst="orthographicFront"/>
+            <a:lightRig rig="threePt" dir="t"/>
+          </a:scene3d>
+          <a:sp3d>
+            <a:bevelT/>
+          </a:sp3d>
+        </p:spPr>
+        <p:txBody>
+          <a:bodyPr wrap="square" rtlCol="0">
+            <a:spAutoFit/>
+          </a:bodyPr>
+          <a:lstStyle/>
+          <a:p>
+            <a:pPr algn="ctr"/>
+            <a:r>
+              <a:rPr lang="en-US" sz="3200" dirty="0" smtClean="0"/>
+              <a:t>General purpose</a:t>
+            </a:r>
+          </a:p>
+          <a:p>
+            <a:pPr algn="ctr"/>
+            <a:endParaRPr lang="en-US" sz="3200" dirty="0"/>
+          </a:p>
+        </p:txBody>
+      </p:sp>
+      <p:pic>
+        <p:nvPicPr>
+          <p:cNvPr id="2051" name="Picture 3" descr="D:\data\FH\Bachelorarbeit\svnroot\presentations\BAS_1\bf_wireframe.png"/>
+          <p:cNvPicPr>
+            <a:picLocks noChangeAspect="1" noChangeArrowheads="1"/>
+          </p:cNvPicPr>
+          <p:nvPr/>
+        </p:nvPicPr>
+        <p:blipFill>
+          <a:blip r:embed="rId2" cstate="print">
+            <a:extLst>
+              <a:ext uri="{28A0092B-C50C-407E-A947-70E740481C1C}">
+                <a14:useLocalDpi xmlns:a14="http://schemas.microsoft.com/office/drawing/2010/main" val="0"/>
+              </a:ext>
+            </a:extLst>
+          </a:blip>
+          <a:srcRect/>
+          <a:stretch>
+            <a:fillRect/>
+          </a:stretch>
+        </p:blipFill>
+        <p:spPr bwMode="auto">
+          <a:xfrm rot="240000">
+            <a:off x="5472120" y="1695401"/>
+            <a:ext cx="3330444" cy="1951621"/>
+          </a:xfrm>
+          <a:prstGeom prst="rect">
+            <a:avLst/>
+          </a:prstGeom>
+          <a:solidFill>
+            <a:srgbClr val="FFFFFF">
+              <a:shade val="85000"/>
+            </a:srgbClr>
+          </a:solidFill>
+          <a:ln w="88900" cap="sq">
+            <a:solidFill>
+              <a:srgbClr val="FFFFFF"/>
+            </a:solidFill>
+            <a:miter lim="800000"/>
+          </a:ln>
+          <a:effectLst>
+            <a:outerShdw blurRad="55000" dist="18000" dir="5400000" algn="tl" rotWithShape="0">
+              <a:srgbClr val="000000">
+                <a:alpha val="40000"/>
+              </a:srgbClr>
+            </a:outerShdw>
+          </a:effectLst>
+          <a:scene3d>
+            <a:camera prst="orthographicFront"/>
+            <a:lightRig rig="twoPt" dir="t">
+              <a:rot lat="0" lon="0" rev="7200000"/>
+            </a:lightRig>
+          </a:scene3d>
+          <a:sp3d>
+            <a:bevelT w="25400" h="19050"/>
+            <a:contourClr>
+              <a:srgbClr val="FFFFFF"/>
+            </a:contourClr>
+          </a:sp3d>
+          <a:extLst>
+            <a:ext uri="{909E8E84-426E-40DD-AFC4-6F175D3DCCD1}">
+              <a14:hiddenFill xmlns:a14="http://schemas.microsoft.com/office/drawing/2010/main">
+                <a:solidFill>
+                  <a:srgbClr val="FFFFFF"/>
+                </a:solidFill>
+              </a14:hiddenFill>
+            </a:ext>
+          </a:extLst>
+        </p:spPr>
+      </p:pic>
+      <p:pic>
+        <p:nvPicPr>
+          <p:cNvPr id="2050" name="Picture 2" descr="D:\data\FH\Bachelorarbeit\svnroot\presentations\BAS_1\bf.jpg"/>
+          <p:cNvPicPr>
+            <a:picLocks noChangeAspect="1" noChangeArrowheads="1"/>
+          </p:cNvPicPr>
+          <p:nvPr/>
+        </p:nvPicPr>
+        <p:blipFill>
+          <a:blip r:embed="rId3" cstate="print">
+            <a:extLst>
+              <a:ext uri="{28A0092B-C50C-407E-A947-70E740481C1C}">
+                <a14:useLocalDpi xmlns:a14="http://schemas.microsoft.com/office/drawing/2010/main" val="0"/>
+              </a:ext>
+            </a:extLst>
+          </a:blip>
+          <a:srcRect/>
+          <a:stretch>
+            <a:fillRect/>
+          </a:stretch>
+        </p:blipFill>
+        <p:spPr bwMode="auto">
+          <a:xfrm rot="-180000">
+            <a:off x="4572000" y="2838745"/>
+            <a:ext cx="3373231" cy="1897442"/>
+          </a:xfrm>
+          <a:prstGeom prst="rect">
+            <a:avLst/>
+          </a:prstGeom>
+          <a:solidFill>
+            <a:srgbClr val="FFFFFF">
+              <a:shade val="85000"/>
+            </a:srgbClr>
+          </a:solidFill>
+          <a:ln w="88900" cap="sq">
+            <a:solidFill>
+              <a:srgbClr val="FFFFFF"/>
+            </a:solidFill>
+            <a:miter lim="800000"/>
+          </a:ln>
+          <a:effectLst>
+            <a:outerShdw blurRad="55000" dist="18000" dir="5400000" algn="tl" rotWithShape="0">
+              <a:srgbClr val="000000">
+                <a:alpha val="40000"/>
+              </a:srgbClr>
+            </a:outerShdw>
+          </a:effectLst>
+          <a:scene3d>
+            <a:camera prst="orthographicFront"/>
+            <a:lightRig rig="twoPt" dir="t">
+              <a:rot lat="0" lon="0" rev="7200000"/>
+            </a:lightRig>
+          </a:scene3d>
+          <a:sp3d>
+            <a:bevelT w="25400" h="19050"/>
+            <a:contourClr>
+              <a:srgbClr val="FFFFFF"/>
+            </a:contourClr>
+          </a:sp3d>
+          <a:extLst>
+            <a:ext uri="{909E8E84-426E-40DD-AFC4-6F175D3DCCD1}">
+              <a14:hiddenFill xmlns:a14="http://schemas.microsoft.com/office/drawing/2010/main">
+                <a:solidFill>
+                  <a:srgbClr val="FFFFFF"/>
+                </a:solidFill>
+              </a14:hiddenFill>
+            </a:ext>
+          </a:extLst>
+        </p:spPr>
+      </p:pic>
+      <p:sp>
+        <p:nvSpPr>
+          <p:cNvPr id="166" name="TextBox 165"/>
+          <p:cNvSpPr txBox="1"/>
+          <p:nvPr/>
+        </p:nvSpPr>
+        <p:spPr>
+          <a:xfrm>
+            <a:off x="0" y="4960471"/>
+            <a:ext cx="9144001" cy="184666"/>
+          </a:xfrm>
+          <a:prstGeom prst="rect">
+            <a:avLst/>
+          </a:prstGeom>
+          <a:noFill/>
+        </p:spPr>
+        <p:txBody>
+          <a:bodyPr wrap="square" rtlCol="0">
+            <a:spAutoFit/>
+          </a:bodyPr>
+          <a:lstStyle/>
+          <a:p>
+            <a:pPr algn="ctr"/>
+            <a:r>
+              <a:rPr lang="en-US" sz="600" dirty="0"/>
+              <a:t>http://</a:t>
+            </a:r>
+            <a:r>
+              <a:rPr lang="en-US" sz="600" dirty="0" smtClean="0"/>
+              <a:t>en.wikipedia.org/wiki/File:Matrix_multiplication_diagram_2.svg     http</a:t>
+            </a:r>
+            <a:r>
+              <a:rPr lang="en-US" sz="600" dirty="0"/>
+              <a:t>://www2.gssm.otsuka.tsukuba.ac.jp/staff/kuno/csr08/hint-05.html </a:t>
+            </a:r>
+            <a:r>
+              <a:rPr lang="en-US" sz="600" dirty="0" smtClean="0"/>
+              <a:t>    http</a:t>
+            </a:r>
+            <a:r>
+              <a:rPr lang="en-US" sz="600" dirty="0"/>
+              <a:t>://</a:t>
+            </a:r>
+            <a:r>
+              <a:rPr lang="en-US" sz="600" dirty="0" smtClean="0"/>
+              <a:t>blog.allenthinks.com     http</a:t>
+            </a:r>
+            <a:r>
+              <a:rPr lang="en-US" sz="600" dirty="0"/>
+              <a:t>://www.geforce.com/games-applications/pc-games/battlefield-3</a:t>
+            </a:r>
+          </a:p>
+        </p:txBody>
+      </p:sp>
+      <p:pic>
+        <p:nvPicPr>
+          <p:cNvPr id="2054" name="Picture 6" descr="D:\data\FH\Bachelorarbeit\svnroot\presentations\BAS_1\radixsort.gif"/>
+          <p:cNvPicPr>
+            <a:picLocks noChangeAspect="1" noChangeArrowheads="1"/>
+          </p:cNvPicPr>
+          <p:nvPr/>
+        </p:nvPicPr>
+        <p:blipFill rotWithShape="1">
+          <a:blip r:embed="rId4">
+            <a:extLst>
+              <a:ext uri="{28A0092B-C50C-407E-A947-70E740481C1C}">
+                <a14:useLocalDpi xmlns:a14="http://schemas.microsoft.com/office/drawing/2010/main" val="0"/>
+              </a:ext>
+            </a:extLst>
+          </a:blip>
+          <a:srcRect l="-2132" t="-2475" r="-2330" b="-3458"/>
+          <a:stretch/>
+        </p:blipFill>
+        <p:spPr bwMode="auto">
+          <a:xfrm>
+            <a:off x="611472" y="1554554"/>
+            <a:ext cx="2862035" cy="2112335"/>
+          </a:xfrm>
+          <a:prstGeom prst="rect">
+            <a:avLst/>
+          </a:prstGeom>
+          <a:solidFill>
+            <a:srgbClr val="FFFFFF">
+              <a:shade val="85000"/>
+            </a:srgbClr>
+          </a:solidFill>
+          <a:ln w="88900" cap="sq">
+            <a:solidFill>
+              <a:srgbClr val="FFFFFF"/>
+            </a:solidFill>
+            <a:miter lim="800000"/>
+          </a:ln>
+          <a:effectLst>
+            <a:outerShdw blurRad="55000" dist="18000" dir="5400000" algn="tl" rotWithShape="0">
+              <a:srgbClr val="000000">
+                <a:alpha val="40000"/>
+              </a:srgbClr>
+            </a:outerShdw>
+          </a:effectLst>
+          <a:scene3d>
+            <a:camera prst="orthographicFront"/>
+            <a:lightRig rig="twoPt" dir="t">
+              <a:rot lat="0" lon="0" rev="7200000"/>
+            </a:lightRig>
+          </a:scene3d>
+          <a:sp3d>
+            <a:bevelT w="25400" h="19050"/>
+            <a:contourClr>
+              <a:srgbClr val="FFFFFF"/>
+            </a:contourClr>
+          </a:sp3d>
+          <a:extLst>
+            <a:ext uri="{909E8E84-426E-40DD-AFC4-6F175D3DCCD1}">
+              <a14:hiddenFill xmlns:a14="http://schemas.microsoft.com/office/drawing/2010/main">
+                <a:solidFill>
+                  <a:srgbClr val="FFFFFF"/>
+                </a:solidFill>
+              </a14:hiddenFill>
+            </a:ext>
+          </a:extLst>
+        </p:spPr>
+      </p:pic>
+      <p:pic>
+        <p:nvPicPr>
+          <p:cNvPr id="2055" name="Picture 7" descr="D:\data\FH\Bachelorarbeit\svnroot\presentations\BAS_1\matrix_mul.png"/>
+          <p:cNvPicPr>
+            <a:picLocks noChangeAspect="1" noChangeArrowheads="1"/>
+          </p:cNvPicPr>
+          <p:nvPr/>
+        </p:nvPicPr>
+        <p:blipFill rotWithShape="1">
+          <a:blip r:embed="rId5">
+            <a:extLst>
+              <a:ext uri="{28A0092B-C50C-407E-A947-70E740481C1C}">
+                <a14:useLocalDpi xmlns:a14="http://schemas.microsoft.com/office/drawing/2010/main" val="0"/>
+              </a:ext>
+            </a:extLst>
+          </a:blip>
+          <a:srcRect l="-1590" t="-2588"/>
+          <a:stretch/>
+        </p:blipFill>
+        <p:spPr bwMode="auto">
+          <a:xfrm>
+            <a:off x="1961652" y="2796468"/>
+            <a:ext cx="2148719" cy="1905128"/>
+          </a:xfrm>
+          <a:prstGeom prst="rect">
+            <a:avLst/>
+          </a:prstGeom>
+          <a:solidFill>
+            <a:srgbClr val="FFFFFF">
+              <a:shade val="85000"/>
+            </a:srgbClr>
+          </a:solidFill>
+          <a:ln w="88900" cap="sq">
+            <a:solidFill>
+              <a:srgbClr val="FFFFFF"/>
+            </a:solidFill>
+            <a:miter lim="800000"/>
+          </a:ln>
+          <a:effectLst>
+            <a:outerShdw blurRad="55000" dist="18000" dir="5400000" algn="tl" rotWithShape="0">
+              <a:srgbClr val="000000">
+                <a:alpha val="40000"/>
+              </a:srgbClr>
+            </a:outerShdw>
+          </a:effectLst>
+          <a:scene3d>
+            <a:camera prst="orthographicFront"/>
+            <a:lightRig rig="twoPt" dir="t">
+              <a:rot lat="0" lon="0" rev="7200000"/>
+            </a:lightRig>
+          </a:scene3d>
+          <a:sp3d>
+            <a:bevelT w="25400" h="19050"/>
+            <a:contourClr>
+              <a:srgbClr val="FFFFFF"/>
+            </a:contourClr>
+          </a:sp3d>
+          <a:extLst>
+            <a:ext uri="{909E8E84-426E-40DD-AFC4-6F175D3DCCD1}">
+              <a14:hiddenFill xmlns:a14="http://schemas.microsoft.com/office/drawing/2010/main">
+                <a:solidFill>
+                  <a:srgbClr val="FFFFFF"/>
+                </a:solidFill>
+              </a14:hiddenFill>
+            </a:ext>
+          </a:extLst>
+        </p:spPr>
+      </p:pic>
+      <p:pic>
+        <p:nvPicPr>
+          <p:cNvPr id="2057" name="Picture 9" descr="D:\data\FH\Bachelorarbeit\svnroot\presentations\BAS_1\derp_happy.png"/>
+          <p:cNvPicPr>
+            <a:picLocks noChangeAspect="1" noChangeArrowheads="1"/>
+          </p:cNvPicPr>
+          <p:nvPr/>
+        </p:nvPicPr>
+        <p:blipFill>
+          <a:blip r:embed="rId6" cstate="print">
+            <a:extLst>
+              <a:ext uri="{28A0092B-C50C-407E-A947-70E740481C1C}">
+                <a14:useLocalDpi xmlns:a14="http://schemas.microsoft.com/office/drawing/2010/main" val="0"/>
+              </a:ext>
+            </a:extLst>
+          </a:blip>
+          <a:srcRect/>
+          <a:stretch>
+            <a:fillRect/>
+          </a:stretch>
+        </p:blipFill>
+        <p:spPr bwMode="auto">
+          <a:xfrm>
+            <a:off x="8043961" y="3890539"/>
+            <a:ext cx="938627" cy="932619"/>
+          </a:xfrm>
+          <a:prstGeom prst="rect">
+            <a:avLst/>
+          </a:prstGeom>
+          <a:noFill/>
+          <a:extLst>
+            <a:ext uri="{909E8E84-426E-40DD-AFC4-6F175D3DCCD1}">
+              <a14:hiddenFill xmlns:a14="http://schemas.microsoft.com/office/drawing/2010/main">
+                <a:solidFill>
+                  <a:srgbClr val="FFFFFF"/>
+                </a:solidFill>
+              </a14:hiddenFill>
+            </a:ext>
+          </a:extLst>
+        </p:spPr>
+      </p:pic>
+      <p:pic>
+        <p:nvPicPr>
+          <p:cNvPr id="2058" name="Picture 10" descr="D:\data\FH\Bachelorarbeit\svnroot\presentations\BAS_1\derp_boring.png"/>
+          <p:cNvPicPr>
+            <a:picLocks noChangeAspect="1" noChangeArrowheads="1"/>
+          </p:cNvPicPr>
+          <p:nvPr/>
+        </p:nvPicPr>
+        <p:blipFill>
+          <a:blip r:embed="rId7" cstate="print">
+            <a:extLst>
+              <a:ext uri="{28A0092B-C50C-407E-A947-70E740481C1C}">
+                <a14:useLocalDpi xmlns:a14="http://schemas.microsoft.com/office/drawing/2010/main" val="0"/>
+              </a:ext>
+            </a:extLst>
+          </a:blip>
+          <a:srcRect/>
+          <a:stretch>
+            <a:fillRect/>
+          </a:stretch>
+        </p:blipFill>
+        <p:spPr bwMode="auto">
+          <a:xfrm>
+            <a:off x="603458" y="3888814"/>
+            <a:ext cx="934344" cy="934344"/>
+          </a:xfrm>
+          <a:prstGeom prst="rect">
+            <a:avLst/>
+          </a:prstGeom>
+          <a:noFill/>
+          <a:extLst>
+            <a:ext uri="{909E8E84-426E-40DD-AFC4-6F175D3DCCD1}">
+              <a14:hiddenFill xmlns:a14="http://schemas.microsoft.com/office/drawing/2010/main">
+                <a:solidFill>
+                  <a:srgbClr val="FFFFFF"/>
+                </a:solidFill>
+              </a14:hiddenFill>
+            </a:ext>
+          </a:extLst>
+        </p:spPr>
+      </p:pic>
+      <p:sp>
+        <p:nvSpPr>
+          <p:cNvPr id="167" name="TextBox 166"/>
+          <p:cNvSpPr txBox="1"/>
+          <p:nvPr/>
+        </p:nvSpPr>
+        <p:spPr>
+          <a:xfrm>
+            <a:off x="3378173" y="983169"/>
+            <a:ext cx="2387654" cy="830997"/>
+          </a:xfrm>
+          <a:prstGeom prst="rect">
+            <a:avLst/>
+          </a:prstGeom>
+          <a:solidFill>
+            <a:schemeClr val="accent2">
+              <a:lumMod val="60000"/>
+              <a:lumOff val="40000"/>
+            </a:schemeClr>
+          </a:solidFill>
+          <a:scene3d>
+            <a:camera prst="orthographicFront"/>
+            <a:lightRig rig="threePt" dir="t"/>
+          </a:scene3d>
+          <a:sp3d>
+            <a:bevelT/>
+          </a:sp3d>
+        </p:spPr>
+        <p:txBody>
+          <a:bodyPr wrap="square" rtlCol="0">
+            <a:spAutoFit/>
+          </a:bodyPr>
+          <a:lstStyle/>
+          <a:p>
+            <a:pPr algn="ctr"/>
+            <a:r>
+              <a:rPr lang="en-US" sz="4800" dirty="0"/>
+              <a:t>GPGPU</a:t>
+            </a:r>
+            <a:endParaRPr lang="en-US" sz="4800" dirty="0"/>
+          </a:p>
+        </p:txBody>
+      </p:sp>
+    </p:spTree>
+    <p:extLst>
+      <p:ext uri="{BB962C8B-B14F-4D97-AF65-F5344CB8AC3E}">
+        <p14:creationId xmlns:p14="http://schemas.microsoft.com/office/powerpoint/2010/main" val="4060906036"/>
+      </p:ext>
+    </p:extLst>
+  </p:cSld>
+  <p:clrMapOvr>
+    <a:masterClrMapping/>
+  </p:clrMapOvr>
+  <p:timing>
+    <p:tnLst>
+      <p:par>
+        <p:cTn id="1" dur="indefinite" restart="never" nodeType="tmRoot">
+          <p:childTnLst>
+            <p:seq concurrent="1" nextAc="seek">
+              <p:cTn id="2" dur="indefinite" nodeType="mainSeq">
+                <p:childTnLst>
+                  <p:par>
+                    <p:cTn id="3" fill="hold">
+                      <p:stCondLst>
+                        <p:cond delay="indefinite"/>
+                      </p:stCondLst>
+                      <p:childTnLst>
+                        <p:par>
+                          <p:cTn id="4" fill="hold">
+                            <p:stCondLst>
+                              <p:cond delay="0"/>
+                            </p:stCondLst>
+                            <p:childTnLst>
+                              <p:par>
+                                <p:cTn id="5" presetID="10" presetClass="entr" presetSubtype="0" fill="hold" grpId="0" nodeType="clickEffect">
+                                  <p:stCondLst>
+                                    <p:cond delay="0"/>
+                                  </p:stCondLst>
+                                  <p:childTnLst>
+                                    <p:set>
+                                      <p:cBhvr>
+                                        <p:cTn id="6" dur="1" fill="hold">
+                                          <p:stCondLst>
+                                            <p:cond delay="0"/>
+                                          </p:stCondLst>
+                                        </p:cTn>
+                                        <p:tgtEl>
+                                          <p:spTgt spid="14"/>
+                                        </p:tgtEl>
+                                        <p:attrNameLst>
+                                          <p:attrName>style.visibility</p:attrName>
+                                        </p:attrNameLst>
+                                      </p:cBhvr>
+                                      <p:to>
+                                        <p:strVal val="visible"/>
+                                      </p:to>
+                                    </p:set>
+                                    <p:animEffect transition="in" filter="fade">
+                                      <p:cBhvr>
+                                        <p:cTn id="7" dur="500"/>
+                                        <p:tgtEl>
+                                          <p:spTgt spid="14"/>
+                                        </p:tgtEl>
+                                      </p:cBhvr>
+                                    </p:animEffect>
+                                  </p:childTnLst>
+                                </p:cTn>
+                              </p:par>
+                              <p:par>
+                                <p:cTn id="8" presetID="10" presetClass="entr" presetSubtype="0" fill="hold" nodeType="withEffect">
+                                  <p:stCondLst>
+                                    <p:cond delay="0"/>
+                                  </p:stCondLst>
+                                  <p:childTnLst>
+                                    <p:set>
+                                      <p:cBhvr>
+                                        <p:cTn id="9" dur="1" fill="hold">
+                                          <p:stCondLst>
+                                            <p:cond delay="0"/>
+                                          </p:stCondLst>
+                                        </p:cTn>
+                                        <p:tgtEl>
+                                          <p:spTgt spid="2054"/>
+                                        </p:tgtEl>
+                                        <p:attrNameLst>
+                                          <p:attrName>style.visibility</p:attrName>
+                                        </p:attrNameLst>
+                                      </p:cBhvr>
+                                      <p:to>
+                                        <p:strVal val="visible"/>
+                                      </p:to>
+                                    </p:set>
+                                    <p:animEffect transition="in" filter="fade">
+                                      <p:cBhvr>
+                                        <p:cTn id="10" dur="500"/>
+                                        <p:tgtEl>
+                                          <p:spTgt spid="2054"/>
+                                        </p:tgtEl>
+                                      </p:cBhvr>
+                                    </p:animEffect>
+                                  </p:childTnLst>
+                                </p:cTn>
+                              </p:par>
+                              <p:par>
+                                <p:cTn id="11" presetID="10" presetClass="entr" presetSubtype="0" fill="hold" nodeType="withEffect">
+                                  <p:stCondLst>
+                                    <p:cond delay="0"/>
+                                  </p:stCondLst>
+                                  <p:childTnLst>
+                                    <p:set>
+                                      <p:cBhvr>
+                                        <p:cTn id="12" dur="1" fill="hold">
+                                          <p:stCondLst>
+                                            <p:cond delay="0"/>
+                                          </p:stCondLst>
+                                        </p:cTn>
+                                        <p:tgtEl>
+                                          <p:spTgt spid="2055"/>
+                                        </p:tgtEl>
+                                        <p:attrNameLst>
+                                          <p:attrName>style.visibility</p:attrName>
+                                        </p:attrNameLst>
+                                      </p:cBhvr>
+                                      <p:to>
+                                        <p:strVal val="visible"/>
+                                      </p:to>
+                                    </p:set>
+                                    <p:animEffect transition="in" filter="fade">
+                                      <p:cBhvr>
+                                        <p:cTn id="13" dur="500"/>
+                                        <p:tgtEl>
+                                          <p:spTgt spid="2055"/>
+                                        </p:tgtEl>
+                                      </p:cBhvr>
+                                    </p:animEffect>
+                                  </p:childTnLst>
+                                </p:cTn>
+                              </p:par>
+                              <p:par>
+                                <p:cTn id="14" presetID="10" presetClass="entr" presetSubtype="0" fill="hold" nodeType="withEffect">
+                                  <p:stCondLst>
+                                    <p:cond delay="0"/>
+                                  </p:stCondLst>
+                                  <p:childTnLst>
+                                    <p:set>
+                                      <p:cBhvr>
+                                        <p:cTn id="15" dur="1" fill="hold">
+                                          <p:stCondLst>
+                                            <p:cond delay="0"/>
+                                          </p:stCondLst>
+                                        </p:cTn>
+                                        <p:tgtEl>
+                                          <p:spTgt spid="2058"/>
+                                        </p:tgtEl>
+                                        <p:attrNameLst>
+                                          <p:attrName>style.visibility</p:attrName>
+                                        </p:attrNameLst>
+                                      </p:cBhvr>
+                                      <p:to>
+                                        <p:strVal val="visible"/>
+                                      </p:to>
+                                    </p:set>
+                                    <p:animEffect transition="in" filter="fade">
+                                      <p:cBhvr>
+                                        <p:cTn id="16" dur="500"/>
+                                        <p:tgtEl>
+                                          <p:spTgt spid="2058"/>
+                                        </p:tgtEl>
+                                      </p:cBhvr>
+                                    </p:animEffect>
+                                  </p:childTnLst>
+                                </p:cTn>
+                              </p:par>
+                            </p:childTnLst>
+                          </p:cTn>
+                        </p:par>
+                      </p:childTnLst>
+                    </p:cTn>
+                  </p:par>
+                  <p:par>
+                    <p:cTn id="17" fill="hold">
+                      <p:stCondLst>
+                        <p:cond delay="indefinite"/>
+                      </p:stCondLst>
+                      <p:childTnLst>
+                        <p:par>
+                          <p:cTn id="18" fill="hold">
+                            <p:stCondLst>
+                              <p:cond delay="0"/>
+                            </p:stCondLst>
+                            <p:childTnLst>
+                              <p:par>
+                                <p:cTn id="19" presetID="10" presetClass="entr" presetSubtype="0" fill="hold" grpId="0" nodeType="clickEffect">
+                                  <p:stCondLst>
+                                    <p:cond delay="0"/>
+                                  </p:stCondLst>
+                                  <p:childTnLst>
+                                    <p:set>
+                                      <p:cBhvr>
+                                        <p:cTn id="20" dur="1" fill="hold">
+                                          <p:stCondLst>
+                                            <p:cond delay="0"/>
+                                          </p:stCondLst>
+                                        </p:cTn>
+                                        <p:tgtEl>
+                                          <p:spTgt spid="167"/>
+                                        </p:tgtEl>
+                                        <p:attrNameLst>
+                                          <p:attrName>style.visibility</p:attrName>
+                                        </p:attrNameLst>
+                                      </p:cBhvr>
+                                      <p:to>
+                                        <p:strVal val="visible"/>
+                                      </p:to>
+                                    </p:set>
+                                    <p:animEffect transition="in" filter="fade">
+                                      <p:cBhvr>
+                                        <p:cTn id="21" dur="500"/>
+                                        <p:tgtEl>
+                                          <p:spTgt spid="167"/>
+                                        </p:tgtEl>
+                                      </p:cBhvr>
+                                    </p:animEffect>
+                                  </p:childTnLst>
+                                </p:cTn>
+                              </p:par>
+                            </p:childTnLst>
+                          </p:cTn>
+                        </p:par>
+                      </p:childTnLst>
+                    </p:cTn>
+                  </p:par>
+                </p:childTnLst>
+              </p:cTn>
+              <p:prevCondLst>
+                <p:cond evt="onPrev" delay="0">
+                  <p:tgtEl>
+                    <p:sldTgt/>
+                  </p:tgtEl>
+                </p:cond>
+              </p:prevCondLst>
+              <p:nextCondLst>
+                <p:cond evt="onNext" delay="0">
+                  <p:tgtEl>
+                    <p:sldTgt/>
+                  </p:tgtEl>
+                </p:cond>
+              </p:nextCondLst>
+            </p:seq>
+          </p:childTnLst>
+        </p:cTn>
+      </p:par>
+    </p:tnLst>
+    <p:bldLst>
+      <p:bldP spid="14" grpId="0" animBg="1"/>
+      <p:bldP spid="167" grpId="0" animBg="1"/>
+    </p:bldLst>
+  </p:timing>
+</p:sld>
+</file>
+
+<file path=ppt/slides/slide3.xml><?xml version="1.0" encoding="utf-8"?>
+<p:sld xmlns:a="http://schemas.openxmlformats.org/drawingml/2006/main" xmlns:r="http://schemas.openxmlformats.org/officeDocument/2006/relationships" xmlns:p="http://schemas.openxmlformats.org/presentationml/2006/main">
+  <p:cSld>
+    <p:spTree>
+      <p:nvGrpSpPr>
+        <p:cNvPr id="1" name=""/>
+        <p:cNvGrpSpPr/>
+        <p:nvPr/>
+      </p:nvGrpSpPr>
+      <p:grpSpPr>
+        <a:xfrm>
+          <a:off x="0" y="0"/>
+          <a:ext cx="0" cy="0"/>
+          <a:chOff x="0" y="0"/>
+          <a:chExt cx="0" cy="0"/>
+        </a:xfrm>
+      </p:grpSpPr>
+      <p:pic>
+        <p:nvPicPr>
+          <p:cNvPr id="3074" name="Picture 2" descr="D:\data\FH\Bachelorarbeit\svnroot\presentations\BAS_1\opencl_logo.jpg"/>
+          <p:cNvPicPr>
+            <a:picLocks noChangeAspect="1" noChangeArrowheads="1"/>
+          </p:cNvPicPr>
+          <p:nvPr/>
+        </p:nvPicPr>
+        <p:blipFill>
+          <a:blip r:embed="rId2">
+            <a:extLst>
+              <a:ext uri="{28A0092B-C50C-407E-A947-70E740481C1C}">
+                <a14:useLocalDpi xmlns:a14="http://schemas.microsoft.com/office/drawing/2010/main" val="0"/>
+              </a:ext>
+            </a:extLst>
+          </a:blip>
+          <a:srcRect/>
+          <a:stretch>
+            <a:fillRect/>
+          </a:stretch>
+        </p:blipFill>
+        <p:spPr bwMode="auto">
+          <a:xfrm>
+            <a:off x="2861772" y="771510"/>
+            <a:ext cx="3240520" cy="3240519"/>
+          </a:xfrm>
+          <a:prstGeom prst="rect">
+            <a:avLst/>
+          </a:prstGeom>
+          <a:noFill/>
+          <a:extLst>
+            <a:ext uri="{909E8E84-426E-40DD-AFC4-6F175D3DCCD1}">
+              <a14:hiddenFill xmlns:a14="http://schemas.microsoft.com/office/drawing/2010/main">
+                <a:solidFill>
+                  <a:srgbClr val="FFFFFF"/>
+                </a:solidFill>
+              </a14:hiddenFill>
+            </a:ext>
+          </a:extLst>
+        </p:spPr>
+      </p:pic>
+    </p:spTree>
+    <p:extLst>
+      <p:ext uri="{BB962C8B-B14F-4D97-AF65-F5344CB8AC3E}">
+        <p14:creationId xmlns:p14="http://schemas.microsoft.com/office/powerpoint/2010/main" val="1575987982"/>
+      </p:ext>
+    </p:extLst>
+  </p:cSld>
+  <p:clrMapOvr>
+    <a:masterClrMapping/>
+  </p:clrMapOvr>
+  <p:timing>
+    <p:tnLst>
+      <p:par>
+        <p:cTn id="1" dur="indefinite" restart="never" nodeType="tmRoot"/>
+      </p:par>
+    </p:tnLst>
+  </p:timing>
+</p:sld>
+</file>
+
+<file path=ppt/slides/slide4.xml><?xml version="1.0" encoding="utf-8"?>
+<p:sld xmlns:a="http://schemas.openxmlformats.org/drawingml/2006/main" xmlns:r="http://schemas.openxmlformats.org/officeDocument/2006/relationships" xmlns:p="http://schemas.openxmlformats.org/presentationml/2006/main">
+  <p:cSld>
+    <p:spTree>
+      <p:nvGrpSpPr>
+        <p:cNvPr id="1" name=""/>
+        <p:cNvGrpSpPr/>
+        <p:nvPr/>
+      </p:nvGrpSpPr>
+      <p:grpSpPr>
+        <a:xfrm>
+          <a:off x="0" y="0"/>
+          <a:ext cx="0" cy="0"/>
+          <a:chOff x="0" y="0"/>
+          <a:chExt cx="0" cy="0"/>
+        </a:xfrm>
+      </p:grpSpPr>
+      <p:sp>
+        <p:nvSpPr>
+          <p:cNvPr id="2" name="Title 1"/>
+          <p:cNvSpPr>
+            <a:spLocks noGrp="1"/>
+          </p:cNvSpPr>
+          <p:nvPr>
+            <p:ph type="title"/>
+          </p:nvPr>
+        </p:nvSpPr>
+        <p:spPr/>
+        <p:txBody>
+          <a:bodyPr/>
+          <a:lstStyle/>
+          <a:p>
+            <a:r>
+              <a:rPr lang="en-US" dirty="0" smtClean="0"/>
+              <a:t>Hardware</a:t>
+            </a:r>
+            <a:endParaRPr lang="en-US" dirty="0"/>
+          </a:p>
+        </p:txBody>
+      </p:sp>
+      <p:sp>
+        <p:nvSpPr>
+          <p:cNvPr id="3" name="Content Placeholder 2"/>
+          <p:cNvSpPr>
+            <a:spLocks noGrp="1"/>
+          </p:cNvSpPr>
+          <p:nvPr>
+            <p:ph idx="1"/>
+          </p:nvPr>
+        </p:nvSpPr>
+        <p:spPr/>
+        <p:txBody>
+          <a:bodyPr/>
+          <a:lstStyle/>
+          <a:p>
+            <a:endParaRPr lang="en-US"/>
+          </a:p>
+        </p:txBody>
+      </p:sp>
+    </p:spTree>
+    <p:extLst>
+      <p:ext uri="{BB962C8B-B14F-4D97-AF65-F5344CB8AC3E}">
+        <p14:creationId xmlns:p14="http://schemas.microsoft.com/office/powerpoint/2010/main" val="1070959989"/>
+      </p:ext>
+    </p:extLst>
+  </p:cSld>
+  <p:clrMapOvr>
+    <a:masterClrMapping/>
+  </p:clrMapOvr>
+  <p:timing>
+    <p:tnLst>
+      <p:par>
+        <p:cTn id="1" dur="indefinite" restart="never" nodeType="tmRoot"/>
+      </p:par>
+    </p:tnLst>
+  </p:timing>
+</p:sld>
+</file>
+
+<file path=ppt/slides/slide5.xml><?xml version="1.0" encoding="utf-8"?>
+<p:sld xmlns:a="http://schemas.openxmlformats.org/drawingml/2006/main" xmlns:r="http://schemas.openxmlformats.org/officeDocument/2006/relationships" xmlns:p="http://schemas.openxmlformats.org/presentationml/2006/main">
+  <p:cSld>
+    <p:spTree>
+      <p:nvGrpSpPr>
+        <p:cNvPr id="1" name=""/>
+        <p:cNvGrpSpPr/>
+        <p:nvPr/>
+      </p:nvGrpSpPr>
+      <p:grpSpPr>
+        <a:xfrm>
+          <a:off x="0" y="0"/>
+          <a:ext cx="0" cy="0"/>
+          <a:chOff x="0" y="0"/>
+          <a:chExt cx="0" cy="0"/>
+        </a:xfrm>
+      </p:grpSpPr>
+      <p:sp>
+        <p:nvSpPr>
+          <p:cNvPr id="2" name="Title 1"/>
+          <p:cNvSpPr>
+            <a:spLocks noGrp="1"/>
+          </p:cNvSpPr>
+          <p:nvPr>
+            <p:ph type="title"/>
+          </p:nvPr>
+        </p:nvSpPr>
+        <p:spPr/>
+        <p:txBody>
+          <a:bodyPr/>
+          <a:lstStyle/>
+          <a:p>
+            <a:r>
+              <a:rPr lang="de-AT" dirty="0" err="1" smtClean="0"/>
+              <a:t>Algorithms</a:t>
+            </a:r>
+            <a:endParaRPr lang="de-AT" dirty="0"/>
+          </a:p>
+        </p:txBody>
+      </p:sp>
+      <p:sp>
+        <p:nvSpPr>
+          <p:cNvPr id="3" name="Content Placeholder 2"/>
+          <p:cNvSpPr>
+            <a:spLocks noGrp="1"/>
+          </p:cNvSpPr>
+          <p:nvPr>
+            <p:ph idx="1"/>
+          </p:nvPr>
+        </p:nvSpPr>
+        <p:spPr/>
+        <p:txBody>
+          <a:bodyPr/>
+          <a:lstStyle/>
+          <a:p>
+            <a:r>
+              <a:rPr lang="de-AT" dirty="0" err="1" smtClean="0"/>
+              <a:t>Sort</a:t>
+            </a:r>
+            <a:endParaRPr lang="de-AT" dirty="0" smtClean="0"/>
+          </a:p>
+          <a:p>
+            <a:r>
+              <a:rPr lang="de-AT" dirty="0" smtClean="0"/>
+              <a:t>Scan</a:t>
+            </a:r>
+          </a:p>
+          <a:p>
+            <a:r>
+              <a:rPr lang="de-AT" dirty="0" smtClean="0"/>
+              <a:t>Matrix </a:t>
+            </a:r>
+            <a:r>
+              <a:rPr lang="de-AT" dirty="0" err="1" smtClean="0"/>
+              <a:t>multiplication</a:t>
+            </a:r>
+            <a:endParaRPr lang="de-AT" dirty="0"/>
+          </a:p>
+        </p:txBody>
+      </p:sp>
+    </p:spTree>
+    <p:extLst>
+      <p:ext uri="{BB962C8B-B14F-4D97-AF65-F5344CB8AC3E}">
+        <p14:creationId xmlns:p14="http://schemas.microsoft.com/office/powerpoint/2010/main" val="371516940"/>
+      </p:ext>
+    </p:extLst>
+  </p:cSld>
+  <p:clrMapOvr>
+    <a:masterClrMapping/>
+  </p:clrMapOvr>
+  <p:timing>
+    <p:tnLst>
+      <p:par>
+        <p:cTn id="1" dur="indefinite" restart="never" nodeType="tmRoot"/>
+      </p:par>
+    </p:tnLst>
+  </p:timing>
+</p:sld>
+</file>
+
+<file path=ppt/slides/slide6.xml><?xml version="1.0" encoding="utf-8"?>
+<p:sld xmlns:a="http://schemas.openxmlformats.org/drawingml/2006/main" xmlns:r="http://schemas.openxmlformats.org/officeDocument/2006/relationships" xmlns:p="http://schemas.openxmlformats.org/presentationml/2006/main">
+  <p:cSld>
+    <p:spTree>
+      <p:nvGrpSpPr>
+        <p:cNvPr id="1" name=""/>
+        <p:cNvGrpSpPr/>
+        <p:nvPr/>
+      </p:nvGrpSpPr>
+      <p:grpSpPr>
+        <a:xfrm>
+          <a:off x="0" y="0"/>
+          <a:ext cx="0" cy="0"/>
+          <a:chOff x="0" y="0"/>
+          <a:chExt cx="0" cy="0"/>
+        </a:xfrm>
+      </p:grpSpPr>
+      <p:sp>
+        <p:nvSpPr>
+          <p:cNvPr id="2" name="Title 1"/>
+          <p:cNvSpPr>
+            <a:spLocks noGrp="1"/>
+          </p:cNvSpPr>
+          <p:nvPr>
+            <p:ph type="title"/>
+          </p:nvPr>
+        </p:nvSpPr>
+        <p:spPr/>
+        <p:txBody>
+          <a:bodyPr/>
+          <a:lstStyle/>
+          <a:p>
+            <a:r>
+              <a:rPr lang="de-AT" dirty="0" err="1" smtClean="0"/>
+              <a:t>Sort</a:t>
+            </a:r>
+            <a:endParaRPr lang="de-AT" dirty="0"/>
+          </a:p>
+        </p:txBody>
+      </p:sp>
+      <p:sp>
+        <p:nvSpPr>
+          <p:cNvPr id="3" name="Content Placeholder 2"/>
+          <p:cNvSpPr>
+            <a:spLocks noGrp="1"/>
+          </p:cNvSpPr>
+          <p:nvPr>
+            <p:ph idx="1"/>
+          </p:nvPr>
+        </p:nvSpPr>
+        <p:spPr/>
+        <p:txBody>
+          <a:bodyPr/>
+          <a:lstStyle/>
+          <a:p>
+            <a:endParaRPr lang="de-AT" dirty="0"/>
+          </a:p>
+        </p:txBody>
+      </p:sp>
+    </p:spTree>
+    <p:extLst>
+      <p:ext uri="{BB962C8B-B14F-4D97-AF65-F5344CB8AC3E}">
+        <p14:creationId xmlns:p14="http://schemas.microsoft.com/office/powerpoint/2010/main" val="1608754944"/>
+      </p:ext>
+    </p:extLst>
+  </p:cSld>
+  <p:clrMapOvr>
+    <a:masterClrMapping/>
+  </p:clrMapOvr>
+  <p:timing>
+    <p:tnLst>
+      <p:par>
+        <p:cTn id="1" dur="indefinite" restart="never" nodeType="tmRoot"/>
+      </p:par>
+    </p:tnLst>
+  </p:timing>
+</p:sld>
+</file>
+
+<file path=ppt/slides/slide7.xml><?xml version="1.0" encoding="utf-8"?>
+<p:sld xmlns:a="http://schemas.openxmlformats.org/drawingml/2006/main" xmlns:r="http://schemas.openxmlformats.org/officeDocument/2006/relationships" xmlns:p="http://schemas.openxmlformats.org/presentationml/2006/main">
+  <p:cSld>
+    <p:spTree>
+      <p:nvGrpSpPr>
+        <p:cNvPr id="1" name=""/>
+        <p:cNvGrpSpPr/>
+        <p:nvPr/>
+      </p:nvGrpSpPr>
+      <p:grpSpPr>
+        <a:xfrm>
+          <a:off x="0" y="0"/>
+          <a:ext cx="0" cy="0"/>
+          <a:chOff x="0" y="0"/>
+          <a:chExt cx="0" cy="0"/>
+        </a:xfrm>
+      </p:grpSpPr>
+      <p:sp>
+        <p:nvSpPr>
+          <p:cNvPr id="2" name="Title 1"/>
+          <p:cNvSpPr>
+            <a:spLocks noGrp="1"/>
+          </p:cNvSpPr>
+          <p:nvPr>
+            <p:ph type="title"/>
+          </p:nvPr>
+        </p:nvSpPr>
+        <p:spPr/>
+        <p:txBody>
+          <a:bodyPr/>
+          <a:lstStyle/>
+          <a:p>
+            <a:r>
+              <a:rPr lang="de-AT" dirty="0" smtClean="0"/>
+              <a:t>Scan</a:t>
+            </a:r>
+            <a:endParaRPr lang="de-AT" dirty="0"/>
+          </a:p>
+        </p:txBody>
+      </p:sp>
+      <p:sp>
+        <p:nvSpPr>
+          <p:cNvPr id="3" name="Content Placeholder 2"/>
+          <p:cNvSpPr>
+            <a:spLocks noGrp="1"/>
+          </p:cNvSpPr>
+          <p:nvPr>
+            <p:ph idx="1"/>
+          </p:nvPr>
+        </p:nvSpPr>
+        <p:spPr/>
+        <p:txBody>
+          <a:bodyPr/>
+          <a:lstStyle/>
+          <a:p>
+            <a:endParaRPr lang="de-AT"/>
+          </a:p>
+        </p:txBody>
+      </p:sp>
+    </p:spTree>
+    <p:extLst>
+      <p:ext uri="{BB962C8B-B14F-4D97-AF65-F5344CB8AC3E}">
+        <p14:creationId xmlns:p14="http://schemas.microsoft.com/office/powerpoint/2010/main" val="3979678495"/>
+      </p:ext>
+    </p:extLst>
+  </p:cSld>
+  <p:clrMapOvr>
+    <a:masterClrMapping/>
+  </p:clrMapOvr>
+</p:sld>
+</file>
+
+<file path=ppt/slides/slide8.xml><?xml version="1.0" encoding="utf-8"?>
+<p:sld xmlns:a="http://schemas.openxmlformats.org/drawingml/2006/main" xmlns:r="http://schemas.openxmlformats.org/officeDocument/2006/relationships" xmlns:p="http://schemas.openxmlformats.org/presentationml/2006/main">
+  <p:cSld>
+    <p:spTree>
+      <p:nvGrpSpPr>
+        <p:cNvPr id="1" name=""/>
+        <p:cNvGrpSpPr/>
+        <p:nvPr/>
+      </p:nvGrpSpPr>
+      <p:grpSpPr>
+        <a:xfrm>
+          <a:off x="0" y="0"/>
+          <a:ext cx="0" cy="0"/>
+          <a:chOff x="0" y="0"/>
+          <a:chExt cx="0" cy="0"/>
+        </a:xfrm>
+      </p:grpSpPr>
+      <p:sp>
+        <p:nvSpPr>
+          <p:cNvPr id="2" name="Title 1"/>
+          <p:cNvSpPr>
+            <a:spLocks noGrp="1"/>
+          </p:cNvSpPr>
+          <p:nvPr>
+            <p:ph type="title"/>
+          </p:nvPr>
+        </p:nvSpPr>
+        <p:spPr/>
+        <p:txBody>
+          <a:bodyPr>
+            <a:normAutofit/>
+          </a:bodyPr>
+          <a:lstStyle/>
+          <a:p>
+            <a:r>
+              <a:rPr lang="de-AT" dirty="0" smtClean="0"/>
+              <a:t>Matrix </a:t>
+            </a:r>
+            <a:r>
+              <a:rPr lang="de-AT" dirty="0" err="1" smtClean="0"/>
+              <a:t>multiplication</a:t>
+            </a:r>
+            <a:r>
+              <a:rPr lang="de-AT" dirty="0" smtClean="0"/>
+              <a:t> (large)</a:t>
+            </a:r>
+            <a:endParaRPr lang="de-AT" dirty="0"/>
+          </a:p>
+        </p:txBody>
+      </p:sp>
+      <p:sp>
+        <p:nvSpPr>
+          <p:cNvPr id="3" name="Content Placeholder 2"/>
+          <p:cNvSpPr>
+            <a:spLocks noGrp="1"/>
+          </p:cNvSpPr>
+          <p:nvPr>
+            <p:ph idx="1"/>
+          </p:nvPr>
+        </p:nvSpPr>
+        <p:spPr/>
+        <p:txBody>
+          <a:bodyPr/>
+          <a:lstStyle/>
+          <a:p>
+            <a:endParaRPr lang="de-AT"/>
+          </a:p>
+        </p:txBody>
+      </p:sp>
+    </p:spTree>
+    <p:extLst>
+      <p:ext uri="{BB962C8B-B14F-4D97-AF65-F5344CB8AC3E}">
+        <p14:creationId xmlns:p14="http://schemas.microsoft.com/office/powerpoint/2010/main" val="595515649"/>
+      </p:ext>
+    </p:extLst>
+  </p:cSld>
+  <p:clrMapOvr>
+    <a:masterClrMapping/>
+  </p:clrMapOvr>
+</p:sld>
+</file>
+
+<file path=ppt/slides/slide9.xml><?xml version="1.0" encoding="utf-8"?>
+<p:sld xmlns:a="http://schemas.openxmlformats.org/drawingml/2006/main" xmlns:r="http://schemas.openxmlformats.org/officeDocument/2006/relationships" xmlns:p="http://schemas.openxmlformats.org/presentationml/2006/main">
+  <p:cSld>
+    <p:spTree>
+      <p:nvGrpSpPr>
+        <p:cNvPr id="1" name=""/>
+        <p:cNvGrpSpPr/>
+        <p:nvPr/>
+      </p:nvGrpSpPr>
+      <p:grpSpPr>
+        <a:xfrm>
+          <a:off x="0" y="0"/>
+          <a:ext cx="0" cy="0"/>
+          <a:chOff x="0" y="0"/>
+          <a:chExt cx="0" cy="0"/>
+        </a:xfrm>
+      </p:grpSpPr>
+      <p:sp>
+        <p:nvSpPr>
+          <p:cNvPr id="2" name="Title 1"/>
+          <p:cNvSpPr>
+            <a:spLocks noGrp="1"/>
+          </p:cNvSpPr>
+          <p:nvPr>
+            <p:ph type="title"/>
+          </p:nvPr>
+        </p:nvSpPr>
+        <p:spPr/>
+        <p:txBody>
+          <a:bodyPr>
+            <a:normAutofit/>
+          </a:bodyPr>
+          <a:lstStyle/>
+          <a:p>
+            <a:r>
+              <a:rPr lang="de-AT" dirty="0" smtClean="0"/>
+              <a:t>Matrix </a:t>
+            </a:r>
+            <a:r>
+              <a:rPr lang="de-AT" dirty="0" err="1" smtClean="0"/>
+              <a:t>multiplication</a:t>
+            </a:r>
+            <a:r>
+              <a:rPr lang="de-AT" dirty="0" smtClean="0"/>
+              <a:t> (</a:t>
+            </a:r>
+            <a:r>
+              <a:rPr lang="de-AT" dirty="0" err="1" smtClean="0"/>
+              <a:t>many</a:t>
+            </a:r>
+            <a:r>
+              <a:rPr lang="de-AT" dirty="0" smtClean="0"/>
+              <a:t>)</a:t>
+            </a:r>
+            <a:endParaRPr lang="de-AT" dirty="0"/>
+          </a:p>
+        </p:txBody>
+      </p:sp>
+      <p:sp>
+        <p:nvSpPr>
+          <p:cNvPr id="3" name="Content Placeholder 2"/>
+          <p:cNvSpPr>
+            <a:spLocks noGrp="1"/>
+          </p:cNvSpPr>
+          <p:nvPr>
+            <p:ph idx="1"/>
+          </p:nvPr>
+        </p:nvSpPr>
+        <p:spPr/>
+        <p:txBody>
+          <a:bodyPr/>
+          <a:lstStyle/>
+          <a:p>
+            <a:endParaRPr lang="de-AT"/>
+          </a:p>
+        </p:txBody>
+      </p:sp>
+    </p:spTree>
+    <p:extLst>
+      <p:ext uri="{BB962C8B-B14F-4D97-AF65-F5344CB8AC3E}">
+        <p14:creationId xmlns:p14="http://schemas.microsoft.com/office/powerpoint/2010/main" val="157039865"/>
+      </p:ext>
+    </p:extLst>
+  </p:cSld>
+  <p:clrMapOvr>
+    <a:masterClrMapping/>
+  </p:clrMapOvr>
+</p:sld>
+</file>
+
 <file path=ppt/theme/theme1.xml><?xml version="1.0" encoding="utf-8"?>
 <a:theme xmlns:a="http://schemas.openxmlformats.org/drawingml/2006/main" name="Office Theme">
   <a:themeElements>
@@ -3114,6 +5508,7 @@
         <a:font script="Mong" typeface="Mongolian Baiti"/>
         <a:font script="Viet" typeface="Times New Roman"/>
         <a:font script="Uigh" typeface="Microsoft Uighur"/>
+        <a:font script="Geor" typeface="Sylfaen"/>
       </a:majorFont>
       <a:minorFont>
         <a:latin typeface="Calibri"/>
@@ -3148,6 +5543,292 @@
         <a:font script="Mong" typeface="Mongolian Baiti"/>
         <a:font script="Viet" typeface="Arial"/>
         <a:font script="Uigh" typeface="Microsoft Uighur"/>
+        <a:font script="Geor" typeface="Sylfaen"/>
+      </a:minorFont>
+    </a:fontScheme>
+    <a:fmtScheme name="Office">
+      <a:fillStyleLst>
+        <a:solidFill>
+          <a:schemeClr val="phClr"/>
+        </a:solidFill>
+        <a:gradFill rotWithShape="1">
+          <a:gsLst>
+            <a:gs pos="0">
+              <a:schemeClr val="phClr">
+                <a:tint val="50000"/>
+                <a:satMod val="300000"/>
+              </a:schemeClr>
+            </a:gs>
+            <a:gs pos="35000">
+              <a:schemeClr val="phClr">
+                <a:tint val="37000"/>
+                <a:satMod val="300000"/>
+              </a:schemeClr>
+            </a:gs>
+            <a:gs pos="100000">
+              <a:schemeClr val="phClr">
+                <a:tint val="15000"/>
+                <a:satMod val="350000"/>
+              </a:schemeClr>
+            </a:gs>
+          </a:gsLst>
+          <a:lin ang="16200000" scaled="1"/>
+        </a:gradFill>
+        <a:gradFill rotWithShape="1">
+          <a:gsLst>
+            <a:gs pos="0">
+              <a:schemeClr val="phClr">
+                <a:shade val="51000"/>
+                <a:satMod val="130000"/>
+              </a:schemeClr>
+            </a:gs>
+            <a:gs pos="80000">
+              <a:schemeClr val="phClr">
+                <a:shade val="93000"/>
+                <a:satMod val="130000"/>
+              </a:schemeClr>
+            </a:gs>
+            <a:gs pos="100000">
+              <a:schemeClr val="phClr">
+                <a:shade val="94000"/>
+                <a:satMod val="135000"/>
+              </a:schemeClr>
+            </a:gs>
+          </a:gsLst>
+          <a:lin ang="16200000" scaled="0"/>
+        </a:gradFill>
+      </a:fillStyleLst>
+      <a:lnStyleLst>
+        <a:ln w="9525" cap="flat" cmpd="sng" algn="ctr">
+          <a:solidFill>
+            <a:schemeClr val="phClr">
+              <a:shade val="95000"/>
+              <a:satMod val="105000"/>
+            </a:schemeClr>
+          </a:solidFill>
+          <a:prstDash val="solid"/>
+        </a:ln>
+        <a:ln w="25400" cap="flat" cmpd="sng" algn="ctr">
+          <a:solidFill>
+            <a:schemeClr val="phClr"/>
+          </a:solidFill>
+          <a:prstDash val="solid"/>
+        </a:ln>
+        <a:ln w="38100" cap="flat" cmpd="sng" algn="ctr">
+          <a:solidFill>
+            <a:schemeClr val="phClr"/>
+          </a:solidFill>
+          <a:prstDash val="solid"/>
+        </a:ln>
+      </a:lnStyleLst>
+      <a:effectStyleLst>
+        <a:effectStyle>
+          <a:effectLst>
+            <a:outerShdw blurRad="40000" dist="20000" dir="5400000" rotWithShape="0">
+              <a:srgbClr val="000000">
+                <a:alpha val="38000"/>
+              </a:srgbClr>
+            </a:outerShdw>
+          </a:effectLst>
+        </a:effectStyle>
+        <a:effectStyle>
+          <a:effectLst>
+            <a:outerShdw blurRad="40000" dist="23000" dir="5400000" rotWithShape="0">
+              <a:srgbClr val="000000">
+                <a:alpha val="35000"/>
+              </a:srgbClr>
+            </a:outerShdw>
+          </a:effectLst>
+        </a:effectStyle>
+        <a:effectStyle>
+          <a:effectLst>
+            <a:outerShdw blurRad="40000" dist="23000" dir="5400000" rotWithShape="0">
+              <a:srgbClr val="000000">
+                <a:alpha val="35000"/>
+              </a:srgbClr>
+            </a:outerShdw>
+          </a:effectLst>
+          <a:scene3d>
+            <a:camera prst="orthographicFront">
+              <a:rot lat="0" lon="0" rev="0"/>
+            </a:camera>
+            <a:lightRig rig="threePt" dir="t">
+              <a:rot lat="0" lon="0" rev="1200000"/>
+            </a:lightRig>
+          </a:scene3d>
+          <a:sp3d>
+            <a:bevelT w="63500" h="25400"/>
+          </a:sp3d>
+        </a:effectStyle>
+      </a:effectStyleLst>
+      <a:bgFillStyleLst>
+        <a:solidFill>
+          <a:schemeClr val="phClr"/>
+        </a:solidFill>
+        <a:gradFill rotWithShape="1">
+          <a:gsLst>
+            <a:gs pos="0">
+              <a:schemeClr val="phClr">
+                <a:tint val="40000"/>
+                <a:satMod val="350000"/>
+              </a:schemeClr>
+            </a:gs>
+            <a:gs pos="40000">
+              <a:schemeClr val="phClr">
+                <a:tint val="45000"/>
+                <a:shade val="99000"/>
+                <a:satMod val="350000"/>
+              </a:schemeClr>
+            </a:gs>
+            <a:gs pos="100000">
+              <a:schemeClr val="phClr">
+                <a:shade val="20000"/>
+                <a:satMod val="255000"/>
+              </a:schemeClr>
+            </a:gs>
+          </a:gsLst>
+          <a:path path="circle">
+            <a:fillToRect l="50000" t="-80000" r="50000" b="180000"/>
+          </a:path>
+        </a:gradFill>
+        <a:gradFill rotWithShape="1">
+          <a:gsLst>
+            <a:gs pos="0">
+              <a:schemeClr val="phClr">
+                <a:tint val="80000"/>
+                <a:satMod val="300000"/>
+              </a:schemeClr>
+            </a:gs>
+            <a:gs pos="100000">
+              <a:schemeClr val="phClr">
+                <a:shade val="30000"/>
+                <a:satMod val="200000"/>
+              </a:schemeClr>
+            </a:gs>
+          </a:gsLst>
+          <a:path path="circle">
+            <a:fillToRect l="50000" t="50000" r="50000" b="50000"/>
+          </a:path>
+        </a:gradFill>
+      </a:bgFillStyleLst>
+    </a:fmtScheme>
+  </a:themeElements>
+  <a:objectDefaults/>
+  <a:extraClrSchemeLst/>
+</a:theme>
+</file>
+
+<file path=ppt/theme/theme2.xml><?xml version="1.0" encoding="utf-8"?>
+<a:theme xmlns:a="http://schemas.openxmlformats.org/drawingml/2006/main" name="Office Theme">
+  <a:themeElements>
+    <a:clrScheme name="Office">
+      <a:dk1>
+        <a:sysClr val="windowText" lastClr="000000"/>
+      </a:dk1>
+      <a:lt1>
+        <a:sysClr val="window" lastClr="FFFFFF"/>
+      </a:lt1>
+      <a:dk2>
+        <a:srgbClr val="1F497D"/>
+      </a:dk2>
+      <a:lt2>
+        <a:srgbClr val="EEECE1"/>
+      </a:lt2>
+      <a:accent1>
+        <a:srgbClr val="4F81BD"/>
+      </a:accent1>
+      <a:accent2>
+        <a:srgbClr val="C0504D"/>
+      </a:accent2>
+      <a:accent3>
+        <a:srgbClr val="9BBB59"/>
+      </a:accent3>
+      <a:accent4>
+        <a:srgbClr val="8064A2"/>
+      </a:accent4>
+      <a:accent5>
+        <a:srgbClr val="4BACC6"/>
+      </a:accent5>
+      <a:accent6>
+        <a:srgbClr val="F79646"/>
+      </a:accent6>
+      <a:hlink>
+        <a:srgbClr val="0000FF"/>
+      </a:hlink>
+      <a:folHlink>
+        <a:srgbClr val="800080"/>
+      </a:folHlink>
+    </a:clrScheme>
+    <a:fontScheme name="Office">
+      <a:majorFont>
+        <a:latin typeface="Calibri"/>
+        <a:ea typeface=""/>
+        <a:cs typeface=""/>
+        <a:font script="Jpan" typeface="ＭＳ Ｐゴシック"/>
+        <a:font script="Hang" typeface="맑은 고딕"/>
+        <a:font script="Hans" typeface="宋体"/>
+        <a:font script="Hant" typeface="新細明體"/>
+        <a:font script="Arab" typeface="Times New Roman"/>
+        <a:font script="Hebr" typeface="Times New Roman"/>
+        <a:font script="Thai" typeface="Angsana New"/>
+        <a:font script="Ethi" typeface="Nyala"/>
+        <a:font script="Beng" typeface="Vrinda"/>
+        <a:font script="Gujr" typeface="Shruti"/>
+        <a:font script="Khmr" typeface="MoolBoran"/>
+        <a:font script="Knda" typeface="Tunga"/>
+        <a:font script="Guru" typeface="Raavi"/>
+        <a:font script="Cans" typeface="Euphemia"/>
+        <a:font script="Cher" typeface="Plantagenet Cherokee"/>
+        <a:font script="Yiii" typeface="Microsoft Yi Baiti"/>
+        <a:font script="Tibt" typeface="Microsoft Himalaya"/>
+        <a:font script="Thaa" typeface="MV Boli"/>
+        <a:font script="Deva" typeface="Mangal"/>
+        <a:font script="Telu" typeface="Gautami"/>
+        <a:font script="Taml" typeface="Latha"/>
+        <a:font script="Syrc" typeface="Estrangelo Edessa"/>
+        <a:font script="Orya" typeface="Kalinga"/>
+        <a:font script="Mlym" typeface="Kartika"/>
+        <a:font script="Laoo" typeface="DokChampa"/>
+        <a:font script="Sinh" typeface="Iskoola Pota"/>
+        <a:font script="Mong" typeface="Mongolian Baiti"/>
+        <a:font script="Viet" typeface="Times New Roman"/>
+        <a:font script="Uigh" typeface="Microsoft Uighur"/>
+        <a:font script="Geor" typeface="Sylfaen"/>
+      </a:majorFont>
+      <a:minorFont>
+        <a:latin typeface="Calibri"/>
+        <a:ea typeface=""/>
+        <a:cs typeface=""/>
+        <a:font script="Jpan" typeface="ＭＳ Ｐゴシック"/>
+        <a:font script="Hang" typeface="맑은 고딕"/>
+        <a:font script="Hans" typeface="宋体"/>
+        <a:font script="Hant" typeface="新細明體"/>
+        <a:font script="Arab" typeface="Arial"/>
+        <a:font script="Hebr" typeface="Arial"/>
+        <a:font script="Thai" typeface="Cordia New"/>
+        <a:font script="Ethi" typeface="Nyala"/>
+        <a:font script="Beng" typeface="Vrinda"/>
+        <a:font script="Gujr" typeface="Shruti"/>
+        <a:font script="Khmr" typeface="DaunPenh"/>
+        <a:font script="Knda" typeface="Tunga"/>
+        <a:font script="Guru" typeface="Raavi"/>
+        <a:font script="Cans" typeface="Euphemia"/>
+        <a:font script="Cher" typeface="Plantagenet Cherokee"/>
+        <a:font script="Yiii" typeface="Microsoft Yi Baiti"/>
+        <a:font script="Tibt" typeface="Microsoft Himalaya"/>
+        <a:font script="Thaa" typeface="MV Boli"/>
+        <a:font script="Deva" typeface="Mangal"/>
+        <a:font script="Telu" typeface="Gautami"/>
+        <a:font script="Taml" typeface="Latha"/>
+        <a:font script="Syrc" typeface="Estrangelo Edessa"/>
+        <a:font script="Orya" typeface="Kalinga"/>
+        <a:font script="Mlym" typeface="Kartika"/>
+        <a:font script="Laoo" typeface="DokChampa"/>
+        <a:font script="Sinh" typeface="Iskoola Pota"/>
+        <a:font script="Mong" typeface="Mongolian Baiti"/>
+        <a:font script="Viet" typeface="Arial"/>
+        <a:font script="Uigh" typeface="Microsoft Uighur"/>
+        <a:font script="Geor" typeface="Sylfaen"/>
       </a:minorFont>
     </a:fontScheme>
     <a:fmtScheme name="Office">

</xml_diff>

<commit_message>
> FINAL VERSION OF PRESENTATION (as used for the actual presentation)
</commit_message>
<xml_diff>
--- a/presentations/BAS_1/OpenCL.pptx
+++ b/presentations/BAS_1/OpenCL.pptx
@@ -11060,7 +11060,7 @@
           <a:p>
             <a:fld id="{FAF648E3-ABF5-4FCD-BDF2-371C3D165212}" type="datetimeFigureOut">
               <a:rPr lang="en-US" smtClean="0"/>
-              <a:t>11/20/2012</a:t>
+              <a:t>11/21/2012</a:t>
             </a:fld>
             <a:endParaRPr lang="en-US"/>
           </a:p>
@@ -14489,7 +14489,7 @@
             <a:fld id="{1D8BD707-D9CF-40AE-B4C6-C98DA3205C09}" type="datetimeFigureOut">
               <a:rPr lang="en-US" smtClean="0"/>
               <a:pPr/>
-              <a:t>11/20/2012</a:t>
+              <a:t>11/21/2012</a:t>
             </a:fld>
             <a:endParaRPr lang="en-US"/>
           </a:p>
@@ -14661,7 +14661,7 @@
             <a:fld id="{1D8BD707-D9CF-40AE-B4C6-C98DA3205C09}" type="datetimeFigureOut">
               <a:rPr lang="en-US" smtClean="0"/>
               <a:pPr/>
-              <a:t>11/20/2012</a:t>
+              <a:t>11/21/2012</a:t>
             </a:fld>
             <a:endParaRPr lang="en-US"/>
           </a:p>
@@ -14843,7 +14843,7 @@
             <a:fld id="{1D8BD707-D9CF-40AE-B4C6-C98DA3205C09}" type="datetimeFigureOut">
               <a:rPr lang="en-US" smtClean="0"/>
               <a:pPr/>
-              <a:t>11/20/2012</a:t>
+              <a:t>11/21/2012</a:t>
             </a:fld>
             <a:endParaRPr lang="en-US"/>
           </a:p>
@@ -15015,7 +15015,7 @@
             <a:fld id="{1D8BD707-D9CF-40AE-B4C6-C98DA3205C09}" type="datetimeFigureOut">
               <a:rPr lang="en-US" smtClean="0"/>
               <a:pPr/>
-              <a:t>11/20/2012</a:t>
+              <a:t>11/21/2012</a:t>
             </a:fld>
             <a:endParaRPr lang="en-US"/>
           </a:p>
@@ -15270,7 +15270,7 @@
             <a:fld id="{1D8BD707-D9CF-40AE-B4C6-C98DA3205C09}" type="datetimeFigureOut">
               <a:rPr lang="en-US" smtClean="0"/>
               <a:pPr/>
-              <a:t>11/20/2012</a:t>
+              <a:t>11/21/2012</a:t>
             </a:fld>
             <a:endParaRPr lang="en-US"/>
           </a:p>
@@ -15560,7 +15560,7 @@
             <a:fld id="{1D8BD707-D9CF-40AE-B4C6-C98DA3205C09}" type="datetimeFigureOut">
               <a:rPr lang="en-US" smtClean="0"/>
               <a:pPr/>
-              <a:t>11/20/2012</a:t>
+              <a:t>11/21/2012</a:t>
             </a:fld>
             <a:endParaRPr lang="en-US"/>
           </a:p>
@@ -15984,7 +15984,7 @@
             <a:fld id="{1D8BD707-D9CF-40AE-B4C6-C98DA3205C09}" type="datetimeFigureOut">
               <a:rPr lang="en-US" smtClean="0"/>
               <a:pPr/>
-              <a:t>11/20/2012</a:t>
+              <a:t>11/21/2012</a:t>
             </a:fld>
             <a:endParaRPr lang="en-US"/>
           </a:p>
@@ -16104,7 +16104,7 @@
             <a:fld id="{1D8BD707-D9CF-40AE-B4C6-C98DA3205C09}" type="datetimeFigureOut">
               <a:rPr lang="en-US" smtClean="0"/>
               <a:pPr/>
-              <a:t>11/20/2012</a:t>
+              <a:t>11/21/2012</a:t>
             </a:fld>
             <a:endParaRPr lang="en-US"/>
           </a:p>
@@ -16201,7 +16201,7 @@
             <a:fld id="{1D8BD707-D9CF-40AE-B4C6-C98DA3205C09}" type="datetimeFigureOut">
               <a:rPr lang="en-US" smtClean="0"/>
               <a:pPr/>
-              <a:t>11/20/2012</a:t>
+              <a:t>11/21/2012</a:t>
             </a:fld>
             <a:endParaRPr lang="en-US"/>
           </a:p>
@@ -16480,7 +16480,7 @@
             <a:fld id="{1D8BD707-D9CF-40AE-B4C6-C98DA3205C09}" type="datetimeFigureOut">
               <a:rPr lang="en-US" smtClean="0"/>
               <a:pPr/>
-              <a:t>11/20/2012</a:t>
+              <a:t>11/21/2012</a:t>
             </a:fld>
             <a:endParaRPr lang="en-US"/>
           </a:p>
@@ -16735,7 +16735,7 @@
             <a:fld id="{1D8BD707-D9CF-40AE-B4C6-C98DA3205C09}" type="datetimeFigureOut">
               <a:rPr lang="en-US" smtClean="0"/>
               <a:pPr/>
-              <a:t>11/20/2012</a:t>
+              <a:t>11/21/2012</a:t>
             </a:fld>
             <a:endParaRPr lang="en-US"/>
           </a:p>
@@ -16974,7 +16974,7 @@
             <a:fld id="{1D8BD707-D9CF-40AE-B4C6-C98DA3205C09}" type="datetimeFigureOut">
               <a:rPr lang="en-US" smtClean="0"/>
               <a:pPr/>
-              <a:t>11/20/2012</a:t>
+              <a:t>11/21/2012</a:t>
             </a:fld>
             <a:endParaRPr lang="en-US"/>
           </a:p>
@@ -17414,47 +17414,6 @@
           </a:extLst>
         </p:spPr>
       </p:pic>
-      <p:pic>
-        <p:nvPicPr>
-          <p:cNvPr id="1028" name="Picture 4" descr="D:\data\FH\Bachelorarbeit\svnroot\presentations\BAS_1\ohgodwhy.png"/>
-          <p:cNvPicPr>
-            <a:picLocks noChangeAspect="1" noChangeArrowheads="1"/>
-          </p:cNvPicPr>
-          <p:nvPr/>
-        </p:nvPicPr>
-        <p:blipFill>
-          <a:blip r:embed="rId4">
-            <a:extLst>
-              <a:ext uri="{28A0092B-C50C-407E-A947-70E740481C1C}">
-                <a14:useLocalDpi xmlns:a14="http://schemas.microsoft.com/office/drawing/2010/main" val="0"/>
-              </a:ext>
-            </a:extLst>
-          </a:blip>
-          <a:srcRect/>
-          <a:stretch>
-            <a:fillRect/>
-          </a:stretch>
-        </p:blipFill>
-        <p:spPr bwMode="auto">
-          <a:xfrm>
-            <a:off x="5382108" y="2772493"/>
-            <a:ext cx="1820724" cy="2409605"/>
-          </a:xfrm>
-          <a:prstGeom prst="rect">
-            <a:avLst/>
-          </a:prstGeom>
-          <a:noFill/>
-          <a:extLst>
-            <a:ext uri="{909E8E84-426E-40DD-AFC4-6F175D3DCCD1}">
-              <a14:hiddenFill xmlns:a14="http://schemas.microsoft.com/office/drawing/2010/main">
-                <a:solidFill>
-                  <a:srgbClr val="FFFFFF"/>
-                </a:solidFill>
-              </a14:hiddenFill>
-            </a:ext>
-          </a:extLst>
-        </p:spPr>
-      </p:pic>
     </p:spTree>
     <p:extLst>
       <p:ext uri="{BB962C8B-B14F-4D97-AF65-F5344CB8AC3E}">
@@ -17468,83 +17427,7 @@
   <p:timing>
     <p:tnLst>
       <p:par>
-        <p:cTn id="1" dur="indefinite" restart="never" nodeType="tmRoot">
-          <p:childTnLst>
-            <p:seq concurrent="1" nextAc="seek">
-              <p:cTn id="2" dur="indefinite" nodeType="mainSeq">
-                <p:childTnLst>
-                  <p:par>
-                    <p:cTn id="3" fill="hold">
-                      <p:stCondLst>
-                        <p:cond delay="indefinite"/>
-                      </p:stCondLst>
-                      <p:childTnLst>
-                        <p:par>
-                          <p:cTn id="4" fill="hold">
-                            <p:stCondLst>
-                              <p:cond delay="0"/>
-                            </p:stCondLst>
-                            <p:childTnLst>
-                              <p:par>
-                                <p:cTn id="5" presetID="10" presetClass="entr" presetSubtype="0" fill="hold" nodeType="clickEffect">
-                                  <p:stCondLst>
-                                    <p:cond delay="0"/>
-                                  </p:stCondLst>
-                                  <p:childTnLst>
-                                    <p:set>
-                                      <p:cBhvr>
-                                        <p:cTn id="6" dur="1" fill="hold">
-                                          <p:stCondLst>
-                                            <p:cond delay="0"/>
-                                          </p:stCondLst>
-                                        </p:cTn>
-                                        <p:tgtEl>
-                                          <p:spTgt spid="1028"/>
-                                        </p:tgtEl>
-                                        <p:attrNameLst>
-                                          <p:attrName>style.visibility</p:attrName>
-                                        </p:attrNameLst>
-                                      </p:cBhvr>
-                                      <p:to>
-                                        <p:strVal val="visible"/>
-                                      </p:to>
-                                    </p:set>
-                                    <p:animEffect transition="in" filter="fade">
-                                      <p:cBhvr>
-                                        <p:cTn id="7" dur="250"/>
-                                        <p:tgtEl>
-                                          <p:spTgt spid="1028"/>
-                                        </p:tgtEl>
-                                      </p:cBhvr>
-                                    </p:animEffect>
-                                  </p:childTnLst>
-                                </p:cTn>
-                              </p:par>
-                            </p:childTnLst>
-                          </p:cTn>
-                        </p:par>
-                      </p:childTnLst>
-                    </p:cTn>
-                  </p:par>
-                </p:childTnLst>
-              </p:cTn>
-              <p:prevCondLst>
-                <p:cond evt="onPrev" delay="0">
-                  <p:tgtEl>
-                    <p:sldTgt/>
-                  </p:tgtEl>
-                </p:cond>
-              </p:prevCondLst>
-              <p:nextCondLst>
-                <p:cond evt="onNext" delay="0">
-                  <p:tgtEl>
-                    <p:sldTgt/>
-                  </p:tgtEl>
-                </p:cond>
-              </p:nextCondLst>
-            </p:seq>
-          </p:childTnLst>
-        </p:cTn>
+        <p:cTn id="1" dur="indefinite" restart="never" nodeType="tmRoot"/>
       </p:par>
     </p:tnLst>
   </p:timing>

</xml_diff>